<commit_message>
[승배] 2020 07 16 UserInterface설계서 수정
</commit_message>
<xml_diff>
--- a/2. User Interface 설계서/UserInterface.pptx
+++ b/2. User Interface 설계서/UserInterface.pptx
@@ -6,31 +6,32 @@
   </p:sldMasterIdLst>
   <p:sldIdLst>
     <p:sldId id="277" r:id="rId2"/>
-    <p:sldId id="278" r:id="rId3"/>
-    <p:sldId id="280" r:id="rId4"/>
-    <p:sldId id="272" r:id="rId5"/>
-    <p:sldId id="275" r:id="rId6"/>
-    <p:sldId id="276" r:id="rId7"/>
+    <p:sldId id="281" r:id="rId3"/>
+    <p:sldId id="278" r:id="rId4"/>
+    <p:sldId id="280" r:id="rId5"/>
+    <p:sldId id="272" r:id="rId6"/>
+    <p:sldId id="275" r:id="rId7"/>
+    <p:sldId id="276" r:id="rId8"/>
   </p:sldIdLst>
   <p:sldSz cx="12192000" cy="6858000"/>
   <p:notesSz cx="6858000" cy="9144000"/>
   <p:embeddedFontLst>
     <p:embeddedFont>
       <p:font typeface="210 콤퓨타세탁 B" panose="02020603020101020101" pitchFamily="18" charset="-127"/>
-      <p:regular r:id="rId8"/>
+      <p:regular r:id="rId9"/>
     </p:embeddedFont>
     <p:embeddedFont>
       <p:font typeface="210 콤퓨타세탁 L" panose="02020603020101020101" pitchFamily="18" charset="-127"/>
-      <p:regular r:id="rId9"/>
+      <p:regular r:id="rId10"/>
     </p:embeddedFont>
     <p:embeddedFont>
       <p:font typeface="210 콤퓨타세탁 R" panose="02020603020101020101" pitchFamily="18" charset="-127"/>
-      <p:regular r:id="rId10"/>
+      <p:regular r:id="rId11"/>
     </p:embeddedFont>
     <p:embeddedFont>
       <p:font typeface="맑은 고딕" panose="020B0503020000020004" pitchFamily="50" charset="-127"/>
-      <p:regular r:id="rId11"/>
-      <p:bold r:id="rId12"/>
+      <p:regular r:id="rId12"/>
+      <p:bold r:id="rId13"/>
     </p:embeddedFont>
   </p:embeddedFontLst>
   <p:defaultTextStyle>
@@ -265,7 +266,7 @@
           <a:p>
             <a:fld id="{158C5662-5AE8-43DE-870E-682D6471314E}" type="datetimeFigureOut">
               <a:rPr lang="ko-KR" altLang="en-US" smtClean="0"/>
-              <a:t>2020-07-08</a:t>
+              <a:t>2020-07-16</a:t>
             </a:fld>
             <a:endParaRPr lang="ko-KR" altLang="en-US"/>
           </a:p>
@@ -433,7 +434,7 @@
           <a:p>
             <a:fld id="{158C5662-5AE8-43DE-870E-682D6471314E}" type="datetimeFigureOut">
               <a:rPr lang="ko-KR" altLang="en-US" smtClean="0"/>
-              <a:t>2020-07-08</a:t>
+              <a:t>2020-07-16</a:t>
             </a:fld>
             <a:endParaRPr lang="ko-KR" altLang="en-US"/>
           </a:p>
@@ -611,7 +612,7 @@
           <a:p>
             <a:fld id="{158C5662-5AE8-43DE-870E-682D6471314E}" type="datetimeFigureOut">
               <a:rPr lang="ko-KR" altLang="en-US" smtClean="0"/>
-              <a:t>2020-07-08</a:t>
+              <a:t>2020-07-16</a:t>
             </a:fld>
             <a:endParaRPr lang="ko-KR" altLang="en-US"/>
           </a:p>
@@ -779,7 +780,7 @@
           <a:p>
             <a:fld id="{158C5662-5AE8-43DE-870E-682D6471314E}" type="datetimeFigureOut">
               <a:rPr lang="ko-KR" altLang="en-US" smtClean="0"/>
-              <a:t>2020-07-08</a:t>
+              <a:t>2020-07-16</a:t>
             </a:fld>
             <a:endParaRPr lang="ko-KR" altLang="en-US"/>
           </a:p>
@@ -1024,7 +1025,7 @@
           <a:p>
             <a:fld id="{158C5662-5AE8-43DE-870E-682D6471314E}" type="datetimeFigureOut">
               <a:rPr lang="ko-KR" altLang="en-US" smtClean="0"/>
-              <a:t>2020-07-08</a:t>
+              <a:t>2020-07-16</a:t>
             </a:fld>
             <a:endParaRPr lang="ko-KR" altLang="en-US"/>
           </a:p>
@@ -1253,7 +1254,7 @@
           <a:p>
             <a:fld id="{158C5662-5AE8-43DE-870E-682D6471314E}" type="datetimeFigureOut">
               <a:rPr lang="ko-KR" altLang="en-US" smtClean="0"/>
-              <a:t>2020-07-08</a:t>
+              <a:t>2020-07-16</a:t>
             </a:fld>
             <a:endParaRPr lang="ko-KR" altLang="en-US"/>
           </a:p>
@@ -1617,7 +1618,7 @@
           <a:p>
             <a:fld id="{158C5662-5AE8-43DE-870E-682D6471314E}" type="datetimeFigureOut">
               <a:rPr lang="ko-KR" altLang="en-US" smtClean="0"/>
-              <a:t>2020-07-08</a:t>
+              <a:t>2020-07-16</a:t>
             </a:fld>
             <a:endParaRPr lang="ko-KR" altLang="en-US"/>
           </a:p>
@@ -1734,7 +1735,7 @@
           <a:p>
             <a:fld id="{158C5662-5AE8-43DE-870E-682D6471314E}" type="datetimeFigureOut">
               <a:rPr lang="ko-KR" altLang="en-US" smtClean="0"/>
-              <a:t>2020-07-08</a:t>
+              <a:t>2020-07-16</a:t>
             </a:fld>
             <a:endParaRPr lang="ko-KR" altLang="en-US"/>
           </a:p>
@@ -1829,7 +1830,7 @@
           <a:p>
             <a:fld id="{158C5662-5AE8-43DE-870E-682D6471314E}" type="datetimeFigureOut">
               <a:rPr lang="ko-KR" altLang="en-US" smtClean="0"/>
-              <a:t>2020-07-08</a:t>
+              <a:t>2020-07-16</a:t>
             </a:fld>
             <a:endParaRPr lang="ko-KR" altLang="en-US"/>
           </a:p>
@@ -2104,7 +2105,7 @@
           <a:p>
             <a:fld id="{158C5662-5AE8-43DE-870E-682D6471314E}" type="datetimeFigureOut">
               <a:rPr lang="ko-KR" altLang="en-US" smtClean="0"/>
-              <a:t>2020-07-08</a:t>
+              <a:t>2020-07-16</a:t>
             </a:fld>
             <a:endParaRPr lang="ko-KR" altLang="en-US"/>
           </a:p>
@@ -2356,7 +2357,7 @@
           <a:p>
             <a:fld id="{158C5662-5AE8-43DE-870E-682D6471314E}" type="datetimeFigureOut">
               <a:rPr lang="ko-KR" altLang="en-US" smtClean="0"/>
-              <a:t>2020-07-08</a:t>
+              <a:t>2020-07-16</a:t>
             </a:fld>
             <a:endParaRPr lang="ko-KR" altLang="en-US"/>
           </a:p>
@@ -2567,7 +2568,7 @@
           <a:p>
             <a:fld id="{158C5662-5AE8-43DE-870E-682D6471314E}" type="datetimeFigureOut">
               <a:rPr lang="ko-KR" altLang="en-US" smtClean="0"/>
-              <a:t>2020-07-08</a:t>
+              <a:t>2020-07-16</a:t>
             </a:fld>
             <a:endParaRPr lang="ko-KR" altLang="en-US"/>
           </a:p>
@@ -3071,17 +3072,7 @@
                 <a:latin typeface="210 콤퓨타세탁 R" panose="02020603020101020101" pitchFamily="18" charset="-127"/>
                 <a:ea typeface="210 콤퓨타세탁 R" panose="02020603020101020101" pitchFamily="18" charset="-127"/>
               </a:rPr>
-              <a:t>1. </a:t>
-            </a:r>
-            <a:r>
-              <a:rPr lang="ko-KR" altLang="en-US" sz="2000" dirty="0">
-                <a:solidFill>
-                  <a:srgbClr val="F28E83"/>
-                </a:solidFill>
-                <a:latin typeface="210 콤퓨타세탁 R" panose="02020603020101020101" pitchFamily="18" charset="-127"/>
-                <a:ea typeface="210 콤퓨타세탁 R" panose="02020603020101020101" pitchFamily="18" charset="-127"/>
-              </a:rPr>
-              <a:t>로딩 후 앱 실행 화면</a:t>
+              <a:t>1. Splash</a:t>
             </a:r>
             <a:endParaRPr lang="ko-KR" altLang="en-US" sz="1000" dirty="0">
               <a:solidFill>
@@ -5014,6 +5005,2157 @@
         </p:nvSpPr>
         <p:spPr>
           <a:xfrm>
+            <a:off x="5569510" y="512461"/>
+            <a:ext cx="891591" cy="253916"/>
+          </a:xfrm>
+          <a:prstGeom prst="rect">
+            <a:avLst/>
+          </a:prstGeom>
+          <a:noFill/>
+          <a:scene3d>
+            <a:camera prst="obliqueTopLeft"/>
+            <a:lightRig rig="threePt" dir="t"/>
+          </a:scene3d>
+        </p:spPr>
+        <p:txBody>
+          <a:bodyPr wrap="none" rtlCol="0">
+            <a:spAutoFit/>
+          </a:bodyPr>
+          <a:lstStyle/>
+          <a:p>
+            <a:r>
+              <a:rPr lang="en-US" altLang="ko-KR" sz="1050" spc="300" dirty="0">
+                <a:solidFill>
+                  <a:srgbClr val="F0776A"/>
+                </a:solidFill>
+                <a:latin typeface="210 콤퓨타세탁 L" panose="02020603020101020101" pitchFamily="18" charset="-127"/>
+                <a:ea typeface="210 콤퓨타세탁 L" panose="02020603020101020101" pitchFamily="18" charset="-127"/>
+              </a:rPr>
+              <a:t>Splash</a:t>
+            </a:r>
+            <a:endParaRPr lang="ko-KR" altLang="en-US" sz="1050" spc="300" dirty="0">
+              <a:solidFill>
+                <a:srgbClr val="F0776A"/>
+              </a:solidFill>
+              <a:latin typeface="210 콤퓨타세탁 L" panose="02020603020101020101" pitchFamily="18" charset="-127"/>
+              <a:ea typeface="210 콤퓨타세탁 L" panose="02020603020101020101" pitchFamily="18" charset="-127"/>
+            </a:endParaRPr>
+          </a:p>
+        </p:txBody>
+      </p:sp>
+      <p:cxnSp>
+        <p:nvCxnSpPr>
+          <p:cNvPr id="44" name="직선 연결선 43">
+            <a:extLst>
+              <a:ext uri="{FF2B5EF4-FFF2-40B4-BE49-F238E27FC236}">
+                <a16:creationId xmlns:a16="http://schemas.microsoft.com/office/drawing/2014/main" id="{830F3C16-B18A-43E6-BD3C-5268E6F019C5}"/>
+              </a:ext>
+            </a:extLst>
+          </p:cNvPr>
+          <p:cNvCxnSpPr/>
+          <p:nvPr/>
+        </p:nvCxnSpPr>
+        <p:spPr>
+          <a:xfrm>
+            <a:off x="5337775" y="457260"/>
+            <a:ext cx="0" cy="364319"/>
+          </a:xfrm>
+          <a:prstGeom prst="line">
+            <a:avLst/>
+          </a:prstGeom>
+          <a:ln w="12700">
+            <a:solidFill>
+              <a:srgbClr val="F0776A"/>
+            </a:solidFill>
+          </a:ln>
+        </p:spPr>
+        <p:style>
+          <a:lnRef idx="1">
+            <a:schemeClr val="accent1"/>
+          </a:lnRef>
+          <a:fillRef idx="0">
+            <a:schemeClr val="accent1"/>
+          </a:fillRef>
+          <a:effectRef idx="0">
+            <a:schemeClr val="accent1"/>
+          </a:effectRef>
+          <a:fontRef idx="minor">
+            <a:schemeClr val="tx1"/>
+          </a:fontRef>
+        </p:style>
+      </p:cxnSp>
+    </p:spTree>
+    <p:extLst>
+      <p:ext uri="{BB962C8B-B14F-4D97-AF65-F5344CB8AC3E}">
+        <p14:creationId xmlns:p14="http://schemas.microsoft.com/office/powerpoint/2010/main" val="1596192221"/>
+      </p:ext>
+    </p:extLst>
+  </p:cSld>
+  <p:clrMapOvr>
+    <a:masterClrMapping/>
+  </p:clrMapOvr>
+</p:sld>
+</file>
+
+<file path=ppt/slides/slide2.xml><?xml version="1.0" encoding="utf-8"?>
+<p:sld xmlns:a="http://schemas.openxmlformats.org/drawingml/2006/main" xmlns:r="http://schemas.openxmlformats.org/officeDocument/2006/relationships" xmlns:p="http://schemas.openxmlformats.org/presentationml/2006/main">
+  <p:cSld>
+    <p:bg>
+      <p:bgPr>
+        <a:solidFill>
+          <a:srgbClr val="E9F1DF"/>
+        </a:solidFill>
+        <a:effectLst/>
+      </p:bgPr>
+    </p:bg>
+    <p:spTree>
+      <p:nvGrpSpPr>
+        <p:cNvPr id="1" name=""/>
+        <p:cNvGrpSpPr/>
+        <p:nvPr/>
+      </p:nvGrpSpPr>
+      <p:grpSpPr>
+        <a:xfrm>
+          <a:off x="0" y="0"/>
+          <a:ext cx="0" cy="0"/>
+          <a:chOff x="0" y="0"/>
+          <a:chExt cx="0" cy="0"/>
+        </a:xfrm>
+      </p:grpSpPr>
+      <p:sp>
+        <p:nvSpPr>
+          <p:cNvPr id="19" name="직사각형 18">
+            <a:extLst>
+              <a:ext uri="{FF2B5EF4-FFF2-40B4-BE49-F238E27FC236}">
+                <a16:creationId xmlns:a16="http://schemas.microsoft.com/office/drawing/2014/main" id="{2EB01818-B21D-4595-8A92-F4B516F48422}"/>
+              </a:ext>
+            </a:extLst>
+          </p:cNvPr>
+          <p:cNvSpPr/>
+          <p:nvPr/>
+        </p:nvSpPr>
+        <p:spPr>
+          <a:xfrm>
+            <a:off x="643719" y="1399277"/>
+            <a:ext cx="4320000" cy="5040000"/>
+          </a:xfrm>
+          <a:prstGeom prst="rect">
+            <a:avLst/>
+          </a:prstGeom>
+          <a:solidFill>
+            <a:srgbClr val="F28E83"/>
+          </a:solidFill>
+          <a:ln>
+            <a:solidFill>
+              <a:srgbClr val="F28E83"/>
+            </a:solidFill>
+          </a:ln>
+          <a:effectLst>
+            <a:softEdge rad="12700"/>
+          </a:effectLst>
+        </p:spPr>
+        <p:style>
+          <a:lnRef idx="2">
+            <a:schemeClr val="accent1">
+              <a:shade val="50000"/>
+            </a:schemeClr>
+          </a:lnRef>
+          <a:fillRef idx="1">
+            <a:schemeClr val="accent1"/>
+          </a:fillRef>
+          <a:effectRef idx="0">
+            <a:schemeClr val="accent1"/>
+          </a:effectRef>
+          <a:fontRef idx="minor">
+            <a:schemeClr val="lt1"/>
+          </a:fontRef>
+        </p:style>
+        <p:txBody>
+          <a:bodyPr rtlCol="0" anchor="ctr"/>
+          <a:lstStyle/>
+          <a:p>
+            <a:pPr algn="ctr"/>
+            <a:endParaRPr lang="ko-KR" altLang="en-US"/>
+          </a:p>
+        </p:txBody>
+      </p:sp>
+      <p:sp>
+        <p:nvSpPr>
+          <p:cNvPr id="96" name="TextBox 95"/>
+          <p:cNvSpPr txBox="1"/>
+          <p:nvPr/>
+        </p:nvSpPr>
+        <p:spPr>
+          <a:xfrm>
+            <a:off x="1489032" y="672966"/>
+            <a:ext cx="3861900" cy="400110"/>
+          </a:xfrm>
+          <a:prstGeom prst="rect">
+            <a:avLst/>
+          </a:prstGeom>
+          <a:noFill/>
+          <a:scene3d>
+            <a:camera prst="obliqueTopLeft"/>
+            <a:lightRig rig="threePt" dir="t"/>
+          </a:scene3d>
+        </p:spPr>
+        <p:txBody>
+          <a:bodyPr wrap="square" rtlCol="0">
+            <a:spAutoFit/>
+          </a:bodyPr>
+          <a:lstStyle/>
+          <a:p>
+            <a:r>
+              <a:rPr lang="en-US" altLang="ko-KR" sz="2000" dirty="0">
+                <a:solidFill>
+                  <a:srgbClr val="F28E83"/>
+                </a:solidFill>
+                <a:latin typeface="210 콤퓨타세탁 R" panose="02020603020101020101" pitchFamily="18" charset="-127"/>
+                <a:ea typeface="210 콤퓨타세탁 R" panose="02020603020101020101" pitchFamily="18" charset="-127"/>
+              </a:rPr>
+              <a:t>1. </a:t>
+            </a:r>
+            <a:r>
+              <a:rPr lang="ko-KR" altLang="en-US" sz="2000" dirty="0">
+                <a:solidFill>
+                  <a:srgbClr val="F28E83"/>
+                </a:solidFill>
+                <a:latin typeface="210 콤퓨타세탁 R" panose="02020603020101020101" pitchFamily="18" charset="-127"/>
+                <a:ea typeface="210 콤퓨타세탁 R" panose="02020603020101020101" pitchFamily="18" charset="-127"/>
+              </a:rPr>
+              <a:t>로딩 후 앱 실행 화면</a:t>
+            </a:r>
+            <a:endParaRPr lang="ko-KR" altLang="en-US" sz="1000" dirty="0">
+              <a:solidFill>
+                <a:srgbClr val="F28E83"/>
+              </a:solidFill>
+              <a:latin typeface="210 콤퓨타세탁 R" panose="02020603020101020101" pitchFamily="18" charset="-127"/>
+              <a:ea typeface="210 콤퓨타세탁 R" panose="02020603020101020101" pitchFamily="18" charset="-127"/>
+            </a:endParaRPr>
+          </a:p>
+        </p:txBody>
+      </p:sp>
+      <p:sp>
+        <p:nvSpPr>
+          <p:cNvPr id="34" name="직사각형 33"/>
+          <p:cNvSpPr/>
+          <p:nvPr/>
+        </p:nvSpPr>
+        <p:spPr>
+          <a:xfrm>
+            <a:off x="304800" y="266700"/>
+            <a:ext cx="11582400" cy="6324600"/>
+          </a:xfrm>
+          <a:prstGeom prst="rect">
+            <a:avLst/>
+          </a:prstGeom>
+          <a:noFill/>
+          <a:ln w="88900">
+            <a:solidFill>
+              <a:srgbClr val="F28E83"/>
+            </a:solidFill>
+          </a:ln>
+        </p:spPr>
+        <p:style>
+          <a:lnRef idx="2">
+            <a:schemeClr val="accent1">
+              <a:shade val="50000"/>
+            </a:schemeClr>
+          </a:lnRef>
+          <a:fillRef idx="1">
+            <a:schemeClr val="accent1"/>
+          </a:fillRef>
+          <a:effectRef idx="0">
+            <a:schemeClr val="accent1"/>
+          </a:effectRef>
+          <a:fontRef idx="minor">
+            <a:schemeClr val="lt1"/>
+          </a:fontRef>
+        </p:style>
+        <p:txBody>
+          <a:bodyPr rtlCol="0" anchor="ctr"/>
+          <a:lstStyle/>
+          <a:p>
+            <a:pPr algn="ctr"/>
+            <a:endParaRPr lang="ko-KR" altLang="en-US"/>
+          </a:p>
+        </p:txBody>
+      </p:sp>
+      <p:pic>
+        <p:nvPicPr>
+          <p:cNvPr id="9" name="그림 8">
+            <a:extLst>
+              <a:ext uri="{FF2B5EF4-FFF2-40B4-BE49-F238E27FC236}">
+                <a16:creationId xmlns:a16="http://schemas.microsoft.com/office/drawing/2014/main" id="{994F8BEB-F284-4C4D-9A2C-E4D0F78EEEAD}"/>
+              </a:ext>
+            </a:extLst>
+          </p:cNvPr>
+          <p:cNvPicPr>
+            <a:picLocks noChangeAspect="1"/>
+          </p:cNvPicPr>
+          <p:nvPr/>
+        </p:nvPicPr>
+        <p:blipFill>
+          <a:blip r:embed="rId2"/>
+          <a:stretch>
+            <a:fillRect/>
+          </a:stretch>
+        </p:blipFill>
+        <p:spPr>
+          <a:xfrm>
+            <a:off x="839199" y="1579662"/>
+            <a:ext cx="3996000" cy="4698456"/>
+          </a:xfrm>
+          <a:prstGeom prst="rect">
+            <a:avLst/>
+          </a:prstGeom>
+          <a:effectLst>
+            <a:softEdge rad="12700"/>
+          </a:effectLst>
+        </p:spPr>
+      </p:pic>
+      <p:grpSp>
+        <p:nvGrpSpPr>
+          <p:cNvPr id="14" name="그룹 13">
+            <a:extLst>
+              <a:ext uri="{FF2B5EF4-FFF2-40B4-BE49-F238E27FC236}">
+                <a16:creationId xmlns:a16="http://schemas.microsoft.com/office/drawing/2014/main" id="{B02F7DEB-0661-4FD1-9931-4FDD4CCAA763}"/>
+              </a:ext>
+            </a:extLst>
+          </p:cNvPr>
+          <p:cNvGrpSpPr/>
+          <p:nvPr/>
+        </p:nvGrpSpPr>
+        <p:grpSpPr>
+          <a:xfrm>
+            <a:off x="923526" y="1693504"/>
+            <a:ext cx="491589" cy="431254"/>
+            <a:chOff x="6754961" y="1609484"/>
+            <a:chExt cx="458300" cy="416396"/>
+          </a:xfrm>
+        </p:grpSpPr>
+        <p:sp>
+          <p:nvSpPr>
+            <p:cNvPr id="70" name="사각형: 둥근 모서리 69">
+              <a:extLst>
+                <a:ext uri="{FF2B5EF4-FFF2-40B4-BE49-F238E27FC236}">
+                  <a16:creationId xmlns:a16="http://schemas.microsoft.com/office/drawing/2014/main" id="{C8253B60-AA2E-4571-A651-DA92FC96A404}"/>
+                </a:ext>
+              </a:extLst>
+            </p:cNvPr>
+            <p:cNvSpPr/>
+            <p:nvPr/>
+          </p:nvSpPr>
+          <p:spPr>
+            <a:xfrm>
+              <a:off x="6754961" y="1609484"/>
+              <a:ext cx="458300" cy="416396"/>
+            </a:xfrm>
+            <a:prstGeom prst="roundRect">
+              <a:avLst/>
+            </a:prstGeom>
+            <a:solidFill>
+              <a:srgbClr val="FFFFFF"/>
+            </a:solidFill>
+            <a:ln>
+              <a:solidFill>
+                <a:srgbClr val="F28E83"/>
+              </a:solidFill>
+            </a:ln>
+            <a:effectLst>
+              <a:softEdge rad="31750"/>
+            </a:effectLst>
+          </p:spPr>
+          <p:style>
+            <a:lnRef idx="2">
+              <a:schemeClr val="accent1">
+                <a:shade val="50000"/>
+              </a:schemeClr>
+            </a:lnRef>
+            <a:fillRef idx="1">
+              <a:schemeClr val="accent1"/>
+            </a:fillRef>
+            <a:effectRef idx="0">
+              <a:schemeClr val="accent1"/>
+            </a:effectRef>
+            <a:fontRef idx="minor">
+              <a:schemeClr val="lt1"/>
+            </a:fontRef>
+          </p:style>
+          <p:txBody>
+            <a:bodyPr rtlCol="0" anchor="ctr"/>
+            <a:lstStyle/>
+            <a:p>
+              <a:pPr algn="ctr"/>
+              <a:endParaRPr lang="ko-KR" altLang="en-US"/>
+            </a:p>
+          </p:txBody>
+        </p:sp>
+        <p:grpSp>
+          <p:nvGrpSpPr>
+            <p:cNvPr id="10" name="그룹 9">
+              <a:extLst>
+                <a:ext uri="{FF2B5EF4-FFF2-40B4-BE49-F238E27FC236}">
+                  <a16:creationId xmlns:a16="http://schemas.microsoft.com/office/drawing/2014/main" id="{9CB7CF27-F5BF-4B8E-82A0-9886728C7386}"/>
+                </a:ext>
+              </a:extLst>
+            </p:cNvPr>
+            <p:cNvGrpSpPr/>
+            <p:nvPr/>
+          </p:nvGrpSpPr>
+          <p:grpSpPr>
+            <a:xfrm>
+              <a:off x="6810154" y="1625769"/>
+              <a:ext cx="363682" cy="400111"/>
+              <a:chOff x="7158951" y="2443411"/>
+              <a:chExt cx="638849" cy="666738"/>
+            </a:xfrm>
+          </p:grpSpPr>
+          <p:grpSp>
+            <p:nvGrpSpPr>
+              <p:cNvPr id="8" name="그룹 7">
+                <a:extLst>
+                  <a:ext uri="{FF2B5EF4-FFF2-40B4-BE49-F238E27FC236}">
+                    <a16:creationId xmlns:a16="http://schemas.microsoft.com/office/drawing/2014/main" id="{2F9039B4-1C2D-4F63-8B4A-9A3F061562AE}"/>
+                  </a:ext>
+                </a:extLst>
+              </p:cNvPr>
+              <p:cNvGrpSpPr/>
+              <p:nvPr/>
+            </p:nvGrpSpPr>
+            <p:grpSpPr>
+              <a:xfrm>
+                <a:off x="7158951" y="2443411"/>
+                <a:ext cx="638849" cy="666738"/>
+                <a:chOff x="1189951" y="630765"/>
+                <a:chExt cx="861646" cy="946140"/>
+              </a:xfrm>
+            </p:grpSpPr>
+            <p:sp>
+              <p:nvSpPr>
+                <p:cNvPr id="58" name="자유형 50">
+                  <a:extLst>
+                    <a:ext uri="{FF2B5EF4-FFF2-40B4-BE49-F238E27FC236}">
+                      <a16:creationId xmlns:a16="http://schemas.microsoft.com/office/drawing/2014/main" id="{62EF769C-F50D-4566-A66F-EC2AAF985954}"/>
+                    </a:ext>
+                  </a:extLst>
+                </p:cNvPr>
+                <p:cNvSpPr/>
+                <p:nvPr/>
+              </p:nvSpPr>
+              <p:spPr>
+                <a:xfrm>
+                  <a:off x="1189951" y="660660"/>
+                  <a:ext cx="861646" cy="916245"/>
+                </a:xfrm>
+                <a:custGeom>
+                  <a:avLst/>
+                  <a:gdLst>
+                    <a:gd name="connsiteX0" fmla="*/ 0 w 4956889"/>
+                    <a:gd name="connsiteY0" fmla="*/ 0 h 1994554"/>
+                    <a:gd name="connsiteX1" fmla="*/ 4350942 w 4956889"/>
+                    <a:gd name="connsiteY1" fmla="*/ 0 h 1994554"/>
+                    <a:gd name="connsiteX2" fmla="*/ 4956889 w 4956889"/>
+                    <a:gd name="connsiteY2" fmla="*/ 423266 h 1994554"/>
+                    <a:gd name="connsiteX3" fmla="*/ 4956889 w 4956889"/>
+                    <a:gd name="connsiteY3" fmla="*/ 1994554 h 1994554"/>
+                    <a:gd name="connsiteX4" fmla="*/ 0 w 4956889"/>
+                    <a:gd name="connsiteY4" fmla="*/ 1994554 h 1994554"/>
+                  </a:gdLst>
+                  <a:ahLst/>
+                  <a:cxnLst>
+                    <a:cxn ang="0">
+                      <a:pos x="connsiteX0" y="connsiteY0"/>
+                    </a:cxn>
+                    <a:cxn ang="0">
+                      <a:pos x="connsiteX1" y="connsiteY1"/>
+                    </a:cxn>
+                    <a:cxn ang="0">
+                      <a:pos x="connsiteX2" y="connsiteY2"/>
+                    </a:cxn>
+                    <a:cxn ang="0">
+                      <a:pos x="connsiteX3" y="connsiteY3"/>
+                    </a:cxn>
+                    <a:cxn ang="0">
+                      <a:pos x="connsiteX4" y="connsiteY4"/>
+                    </a:cxn>
+                  </a:cxnLst>
+                  <a:rect l="l" t="t" r="r" b="b"/>
+                  <a:pathLst>
+                    <a:path w="4956889" h="1994554">
+                      <a:moveTo>
+                        <a:pt x="0" y="0"/>
+                      </a:moveTo>
+                      <a:lnTo>
+                        <a:pt x="4350942" y="0"/>
+                      </a:lnTo>
+                      <a:lnTo>
+                        <a:pt x="4956889" y="423266"/>
+                      </a:lnTo>
+                      <a:lnTo>
+                        <a:pt x="4956889" y="1994554"/>
+                      </a:lnTo>
+                      <a:lnTo>
+                        <a:pt x="0" y="1994554"/>
+                      </a:lnTo>
+                      <a:close/>
+                    </a:path>
+                  </a:pathLst>
+                </a:custGeom>
+                <a:noFill/>
+                <a:ln w="50800">
+                  <a:solidFill>
+                    <a:srgbClr val="F28E83"/>
+                  </a:solidFill>
+                </a:ln>
+              </p:spPr>
+              <p:style>
+                <a:lnRef idx="2">
+                  <a:schemeClr val="accent1">
+                    <a:shade val="50000"/>
+                  </a:schemeClr>
+                </a:lnRef>
+                <a:fillRef idx="1">
+                  <a:schemeClr val="accent1"/>
+                </a:fillRef>
+                <a:effectRef idx="0">
+                  <a:schemeClr val="accent1"/>
+                </a:effectRef>
+                <a:fontRef idx="minor">
+                  <a:schemeClr val="lt1"/>
+                </a:fontRef>
+              </p:style>
+              <p:txBody>
+                <a:bodyPr rtlCol="0" anchor="ctr"/>
+                <a:lstStyle/>
+                <a:p>
+                  <a:pPr algn="ctr"/>
+                  <a:endParaRPr lang="ko-KR" altLang="en-US"/>
+                </a:p>
+              </p:txBody>
+            </p:sp>
+            <p:sp>
+              <p:nvSpPr>
+                <p:cNvPr id="59" name="자유형 48">
+                  <a:extLst>
+                    <a:ext uri="{FF2B5EF4-FFF2-40B4-BE49-F238E27FC236}">
+                      <a16:creationId xmlns:a16="http://schemas.microsoft.com/office/drawing/2014/main" id="{8268FE59-246A-40F0-8671-1444BF3074CD}"/>
+                    </a:ext>
+                  </a:extLst>
+                </p:cNvPr>
+                <p:cNvSpPr/>
+                <p:nvPr/>
+              </p:nvSpPr>
+              <p:spPr>
+                <a:xfrm rot="5400000" flipH="1">
+                  <a:off x="1868528" y="672064"/>
+                  <a:ext cx="224367" cy="141770"/>
+                </a:xfrm>
+                <a:custGeom>
+                  <a:avLst/>
+                  <a:gdLst>
+                    <a:gd name="connsiteX0" fmla="*/ 0 w 618317"/>
+                    <a:gd name="connsiteY0" fmla="*/ 717248 h 717248"/>
+                    <a:gd name="connsiteX1" fmla="*/ 618317 w 618317"/>
+                    <a:gd name="connsiteY1" fmla="*/ 717248 h 717248"/>
+                    <a:gd name="connsiteX2" fmla="*/ 0 w 618317"/>
+                    <a:gd name="connsiteY2" fmla="*/ 0 h 717248"/>
+                  </a:gdLst>
+                  <a:ahLst/>
+                  <a:cxnLst>
+                    <a:cxn ang="0">
+                      <a:pos x="connsiteX0" y="connsiteY0"/>
+                    </a:cxn>
+                    <a:cxn ang="0">
+                      <a:pos x="connsiteX1" y="connsiteY1"/>
+                    </a:cxn>
+                    <a:cxn ang="0">
+                      <a:pos x="connsiteX2" y="connsiteY2"/>
+                    </a:cxn>
+                  </a:cxnLst>
+                  <a:rect l="l" t="t" r="r" b="b"/>
+                  <a:pathLst>
+                    <a:path w="618317" h="717248">
+                      <a:moveTo>
+                        <a:pt x="0" y="717248"/>
+                      </a:moveTo>
+                      <a:lnTo>
+                        <a:pt x="618317" y="717248"/>
+                      </a:lnTo>
+                      <a:lnTo>
+                        <a:pt x="0" y="0"/>
+                      </a:lnTo>
+                      <a:close/>
+                    </a:path>
+                  </a:pathLst>
+                </a:custGeom>
+                <a:solidFill>
+                  <a:srgbClr val="F28E83"/>
+                </a:solidFill>
+                <a:ln>
+                  <a:noFill/>
+                </a:ln>
+              </p:spPr>
+              <p:style>
+                <a:lnRef idx="2">
+                  <a:schemeClr val="accent1">
+                    <a:shade val="50000"/>
+                  </a:schemeClr>
+                </a:lnRef>
+                <a:fillRef idx="1">
+                  <a:schemeClr val="accent1"/>
+                </a:fillRef>
+                <a:effectRef idx="0">
+                  <a:schemeClr val="accent1"/>
+                </a:effectRef>
+                <a:fontRef idx="minor">
+                  <a:schemeClr val="lt1"/>
+                </a:fontRef>
+              </p:style>
+              <p:txBody>
+                <a:bodyPr rtlCol="0" anchor="ctr"/>
+                <a:lstStyle/>
+                <a:p>
+                  <a:pPr algn="ctr"/>
+                  <a:endParaRPr lang="ko-KR" altLang="en-US"/>
+                </a:p>
+              </p:txBody>
+            </p:sp>
+          </p:grpSp>
+          <p:grpSp>
+            <p:nvGrpSpPr>
+              <p:cNvPr id="61" name="그룹 60">
+                <a:extLst>
+                  <a:ext uri="{FF2B5EF4-FFF2-40B4-BE49-F238E27FC236}">
+                    <a16:creationId xmlns:a16="http://schemas.microsoft.com/office/drawing/2014/main" id="{C71DDB5A-B257-4955-83E7-8F8959C9150E}"/>
+                  </a:ext>
+                </a:extLst>
+              </p:cNvPr>
+              <p:cNvGrpSpPr/>
+              <p:nvPr/>
+            </p:nvGrpSpPr>
+            <p:grpSpPr>
+              <a:xfrm>
+                <a:off x="7282056" y="2608545"/>
+                <a:ext cx="406399" cy="60438"/>
+                <a:chOff x="4122570" y="523618"/>
+                <a:chExt cx="1074769" cy="90329"/>
+              </a:xfrm>
+            </p:grpSpPr>
+            <p:cxnSp>
+              <p:nvCxnSpPr>
+                <p:cNvPr id="62" name="직선 연결선 61">
+                  <a:extLst>
+                    <a:ext uri="{FF2B5EF4-FFF2-40B4-BE49-F238E27FC236}">
+                      <a16:creationId xmlns:a16="http://schemas.microsoft.com/office/drawing/2014/main" id="{269BA614-6148-46C4-9CB9-88D02EF470FB}"/>
+                    </a:ext>
+                  </a:extLst>
+                </p:cNvPr>
+                <p:cNvCxnSpPr/>
+                <p:nvPr/>
+              </p:nvCxnSpPr>
+              <p:spPr>
+                <a:xfrm>
+                  <a:off x="4122570" y="574701"/>
+                  <a:ext cx="987741" cy="0"/>
+                </a:xfrm>
+                <a:prstGeom prst="line">
+                  <a:avLst/>
+                </a:prstGeom>
+                <a:ln w="25400" cap="rnd">
+                  <a:solidFill>
+                    <a:srgbClr val="F28E83"/>
+                  </a:solidFill>
+                </a:ln>
+                <a:scene3d>
+                  <a:camera prst="obliqueTopLeft"/>
+                  <a:lightRig rig="threePt" dir="t"/>
+                </a:scene3d>
+              </p:spPr>
+              <p:style>
+                <a:lnRef idx="1">
+                  <a:schemeClr val="accent1"/>
+                </a:lnRef>
+                <a:fillRef idx="0">
+                  <a:schemeClr val="accent1"/>
+                </a:fillRef>
+                <a:effectRef idx="0">
+                  <a:schemeClr val="accent1"/>
+                </a:effectRef>
+                <a:fontRef idx="minor">
+                  <a:schemeClr val="tx1"/>
+                </a:fontRef>
+              </p:style>
+            </p:cxnSp>
+            <p:sp>
+              <p:nvSpPr>
+                <p:cNvPr id="63" name="타원 62">
+                  <a:extLst>
+                    <a:ext uri="{FF2B5EF4-FFF2-40B4-BE49-F238E27FC236}">
+                      <a16:creationId xmlns:a16="http://schemas.microsoft.com/office/drawing/2014/main" id="{1FC19903-A5FB-4144-B349-4403EDEF1D65}"/>
+                    </a:ext>
+                  </a:extLst>
+                </p:cNvPr>
+                <p:cNvSpPr/>
+                <p:nvPr/>
+              </p:nvSpPr>
+              <p:spPr>
+                <a:xfrm rot="5400000">
+                  <a:off x="5107010" y="523618"/>
+                  <a:ext cx="90329" cy="90329"/>
+                </a:xfrm>
+                <a:prstGeom prst="ellipse">
+                  <a:avLst/>
+                </a:prstGeom>
+                <a:solidFill>
+                  <a:srgbClr val="F28E83"/>
+                </a:solidFill>
+                <a:ln>
+                  <a:noFill/>
+                </a:ln>
+              </p:spPr>
+              <p:style>
+                <a:lnRef idx="2">
+                  <a:schemeClr val="accent1">
+                    <a:shade val="50000"/>
+                  </a:schemeClr>
+                </a:lnRef>
+                <a:fillRef idx="1">
+                  <a:schemeClr val="accent1"/>
+                </a:fillRef>
+                <a:effectRef idx="0">
+                  <a:schemeClr val="accent1"/>
+                </a:effectRef>
+                <a:fontRef idx="minor">
+                  <a:schemeClr val="lt1"/>
+                </a:fontRef>
+              </p:style>
+              <p:txBody>
+                <a:bodyPr rtlCol="0" anchor="ctr"/>
+                <a:lstStyle/>
+                <a:p>
+                  <a:pPr algn="ctr"/>
+                  <a:endParaRPr lang="ko-KR" altLang="en-US"/>
+                </a:p>
+              </p:txBody>
+            </p:sp>
+          </p:grpSp>
+          <p:grpSp>
+            <p:nvGrpSpPr>
+              <p:cNvPr id="64" name="그룹 63">
+                <a:extLst>
+                  <a:ext uri="{FF2B5EF4-FFF2-40B4-BE49-F238E27FC236}">
+                    <a16:creationId xmlns:a16="http://schemas.microsoft.com/office/drawing/2014/main" id="{E7F1292D-B4CF-49AA-A62E-714CC2971A7C}"/>
+                  </a:ext>
+                </a:extLst>
+              </p:cNvPr>
+              <p:cNvGrpSpPr/>
+              <p:nvPr/>
+            </p:nvGrpSpPr>
+            <p:grpSpPr>
+              <a:xfrm>
+                <a:off x="7282056" y="2760945"/>
+                <a:ext cx="406399" cy="60438"/>
+                <a:chOff x="4122570" y="523618"/>
+                <a:chExt cx="1074769" cy="90329"/>
+              </a:xfrm>
+            </p:grpSpPr>
+            <p:cxnSp>
+              <p:nvCxnSpPr>
+                <p:cNvPr id="65" name="직선 연결선 64">
+                  <a:extLst>
+                    <a:ext uri="{FF2B5EF4-FFF2-40B4-BE49-F238E27FC236}">
+                      <a16:creationId xmlns:a16="http://schemas.microsoft.com/office/drawing/2014/main" id="{07741D75-84BC-491B-8D48-EAB9C32C871A}"/>
+                    </a:ext>
+                  </a:extLst>
+                </p:cNvPr>
+                <p:cNvCxnSpPr/>
+                <p:nvPr/>
+              </p:nvCxnSpPr>
+              <p:spPr>
+                <a:xfrm>
+                  <a:off x="4122570" y="574701"/>
+                  <a:ext cx="987740" cy="0"/>
+                </a:xfrm>
+                <a:prstGeom prst="line">
+                  <a:avLst/>
+                </a:prstGeom>
+                <a:ln w="25400" cap="rnd">
+                  <a:solidFill>
+                    <a:srgbClr val="F28E83"/>
+                  </a:solidFill>
+                </a:ln>
+                <a:scene3d>
+                  <a:camera prst="obliqueTopLeft"/>
+                  <a:lightRig rig="threePt" dir="t"/>
+                </a:scene3d>
+              </p:spPr>
+              <p:style>
+                <a:lnRef idx="1">
+                  <a:schemeClr val="accent1"/>
+                </a:lnRef>
+                <a:fillRef idx="0">
+                  <a:schemeClr val="accent1"/>
+                </a:fillRef>
+                <a:effectRef idx="0">
+                  <a:schemeClr val="accent1"/>
+                </a:effectRef>
+                <a:fontRef idx="minor">
+                  <a:schemeClr val="tx1"/>
+                </a:fontRef>
+              </p:style>
+            </p:cxnSp>
+            <p:sp>
+              <p:nvSpPr>
+                <p:cNvPr id="66" name="타원 65">
+                  <a:extLst>
+                    <a:ext uri="{FF2B5EF4-FFF2-40B4-BE49-F238E27FC236}">
+                      <a16:creationId xmlns:a16="http://schemas.microsoft.com/office/drawing/2014/main" id="{FC8D43D7-5DC1-41CC-9603-FF85E070554B}"/>
+                    </a:ext>
+                  </a:extLst>
+                </p:cNvPr>
+                <p:cNvSpPr/>
+                <p:nvPr/>
+              </p:nvSpPr>
+              <p:spPr>
+                <a:xfrm rot="5400000">
+                  <a:off x="5107010" y="523618"/>
+                  <a:ext cx="90329" cy="90329"/>
+                </a:xfrm>
+                <a:prstGeom prst="ellipse">
+                  <a:avLst/>
+                </a:prstGeom>
+                <a:solidFill>
+                  <a:srgbClr val="F28E83"/>
+                </a:solidFill>
+                <a:ln>
+                  <a:noFill/>
+                </a:ln>
+              </p:spPr>
+              <p:style>
+                <a:lnRef idx="2">
+                  <a:schemeClr val="accent1">
+                    <a:shade val="50000"/>
+                  </a:schemeClr>
+                </a:lnRef>
+                <a:fillRef idx="1">
+                  <a:schemeClr val="accent1"/>
+                </a:fillRef>
+                <a:effectRef idx="0">
+                  <a:schemeClr val="accent1"/>
+                </a:effectRef>
+                <a:fontRef idx="minor">
+                  <a:schemeClr val="lt1"/>
+                </a:fontRef>
+              </p:style>
+              <p:txBody>
+                <a:bodyPr rtlCol="0" anchor="ctr"/>
+                <a:lstStyle/>
+                <a:p>
+                  <a:pPr algn="ctr"/>
+                  <a:endParaRPr lang="ko-KR" altLang="en-US"/>
+                </a:p>
+              </p:txBody>
+            </p:sp>
+          </p:grpSp>
+          <p:grpSp>
+            <p:nvGrpSpPr>
+              <p:cNvPr id="67" name="그룹 66">
+                <a:extLst>
+                  <a:ext uri="{FF2B5EF4-FFF2-40B4-BE49-F238E27FC236}">
+                    <a16:creationId xmlns:a16="http://schemas.microsoft.com/office/drawing/2014/main" id="{AD9D2356-F1E7-449B-87D1-ED45B8F1E4A7}"/>
+                  </a:ext>
+                </a:extLst>
+              </p:cNvPr>
+              <p:cNvGrpSpPr/>
+              <p:nvPr/>
+            </p:nvGrpSpPr>
+            <p:grpSpPr>
+              <a:xfrm>
+                <a:off x="7282056" y="2913345"/>
+                <a:ext cx="406399" cy="60438"/>
+                <a:chOff x="4122570" y="523618"/>
+                <a:chExt cx="1074769" cy="90329"/>
+              </a:xfrm>
+            </p:grpSpPr>
+            <p:cxnSp>
+              <p:nvCxnSpPr>
+                <p:cNvPr id="68" name="직선 연결선 67">
+                  <a:extLst>
+                    <a:ext uri="{FF2B5EF4-FFF2-40B4-BE49-F238E27FC236}">
+                      <a16:creationId xmlns:a16="http://schemas.microsoft.com/office/drawing/2014/main" id="{F56748C4-6B69-4BE6-8D3D-AA36AD398A4E}"/>
+                    </a:ext>
+                  </a:extLst>
+                </p:cNvPr>
+                <p:cNvCxnSpPr/>
+                <p:nvPr/>
+              </p:nvCxnSpPr>
+              <p:spPr>
+                <a:xfrm>
+                  <a:off x="4122570" y="574701"/>
+                  <a:ext cx="987741" cy="0"/>
+                </a:xfrm>
+                <a:prstGeom prst="line">
+                  <a:avLst/>
+                </a:prstGeom>
+                <a:ln w="25400" cap="rnd">
+                  <a:solidFill>
+                    <a:srgbClr val="F28E83"/>
+                  </a:solidFill>
+                </a:ln>
+                <a:scene3d>
+                  <a:camera prst="obliqueTopLeft"/>
+                  <a:lightRig rig="threePt" dir="t"/>
+                </a:scene3d>
+              </p:spPr>
+              <p:style>
+                <a:lnRef idx="1">
+                  <a:schemeClr val="accent1"/>
+                </a:lnRef>
+                <a:fillRef idx="0">
+                  <a:schemeClr val="accent1"/>
+                </a:fillRef>
+                <a:effectRef idx="0">
+                  <a:schemeClr val="accent1"/>
+                </a:effectRef>
+                <a:fontRef idx="minor">
+                  <a:schemeClr val="tx1"/>
+                </a:fontRef>
+              </p:style>
+            </p:cxnSp>
+            <p:sp>
+              <p:nvSpPr>
+                <p:cNvPr id="69" name="타원 68">
+                  <a:extLst>
+                    <a:ext uri="{FF2B5EF4-FFF2-40B4-BE49-F238E27FC236}">
+                      <a16:creationId xmlns:a16="http://schemas.microsoft.com/office/drawing/2014/main" id="{1FBCC61D-1B7C-49A8-864E-CCE93F31DE62}"/>
+                    </a:ext>
+                  </a:extLst>
+                </p:cNvPr>
+                <p:cNvSpPr/>
+                <p:nvPr/>
+              </p:nvSpPr>
+              <p:spPr>
+                <a:xfrm rot="5400000">
+                  <a:off x="5107010" y="523618"/>
+                  <a:ext cx="90329" cy="90329"/>
+                </a:xfrm>
+                <a:prstGeom prst="ellipse">
+                  <a:avLst/>
+                </a:prstGeom>
+                <a:solidFill>
+                  <a:srgbClr val="F28E83"/>
+                </a:solidFill>
+                <a:ln>
+                  <a:noFill/>
+                </a:ln>
+              </p:spPr>
+              <p:style>
+                <a:lnRef idx="2">
+                  <a:schemeClr val="accent1">
+                    <a:shade val="50000"/>
+                  </a:schemeClr>
+                </a:lnRef>
+                <a:fillRef idx="1">
+                  <a:schemeClr val="accent1"/>
+                </a:fillRef>
+                <a:effectRef idx="0">
+                  <a:schemeClr val="accent1"/>
+                </a:effectRef>
+                <a:fontRef idx="minor">
+                  <a:schemeClr val="lt1"/>
+                </a:fontRef>
+              </p:style>
+              <p:txBody>
+                <a:bodyPr rtlCol="0" anchor="ctr"/>
+                <a:lstStyle/>
+                <a:p>
+                  <a:pPr algn="ctr"/>
+                  <a:endParaRPr lang="ko-KR" altLang="en-US"/>
+                </a:p>
+              </p:txBody>
+            </p:sp>
+          </p:grpSp>
+        </p:grpSp>
+      </p:grpSp>
+      <p:pic>
+        <p:nvPicPr>
+          <p:cNvPr id="7" name="그림 6">
+            <a:extLst>
+              <a:ext uri="{FF2B5EF4-FFF2-40B4-BE49-F238E27FC236}">
+                <a16:creationId xmlns:a16="http://schemas.microsoft.com/office/drawing/2014/main" id="{35447065-ABE8-4DA1-BAB5-C893D7736EAE}"/>
+              </a:ext>
+            </a:extLst>
+          </p:cNvPr>
+          <p:cNvPicPr>
+            <a:picLocks noChangeAspect="1"/>
+          </p:cNvPicPr>
+          <p:nvPr/>
+        </p:nvPicPr>
+        <p:blipFill rotWithShape="1">
+          <a:blip r:embed="rId3" cstate="print">
+            <a:duotone>
+              <a:schemeClr val="accent2">
+                <a:shade val="45000"/>
+                <a:satMod val="135000"/>
+              </a:schemeClr>
+              <a:prstClr val="white"/>
+            </a:duotone>
+            <a:extLst>
+              <a:ext uri="{28A0092B-C50C-407E-A947-70E740481C1C}">
+                <a14:useLocalDpi xmlns:a14="http://schemas.microsoft.com/office/drawing/2010/main" val="0"/>
+              </a:ext>
+            </a:extLst>
+          </a:blip>
+          <a:srcRect l="1280" t="-1091" r="31077" b="1091"/>
+          <a:stretch/>
+        </p:blipFill>
+        <p:spPr>
+          <a:xfrm flipH="1">
+            <a:off x="3719537" y="2283172"/>
+            <a:ext cx="149233" cy="220619"/>
+          </a:xfrm>
+          <a:prstGeom prst="rect">
+            <a:avLst/>
+          </a:prstGeom>
+        </p:spPr>
+      </p:pic>
+      <p:pic>
+        <p:nvPicPr>
+          <p:cNvPr id="72" name="그림 71">
+            <a:extLst>
+              <a:ext uri="{FF2B5EF4-FFF2-40B4-BE49-F238E27FC236}">
+                <a16:creationId xmlns:a16="http://schemas.microsoft.com/office/drawing/2014/main" id="{99427A33-AAF8-4456-834B-0FB0B90D9B23}"/>
+              </a:ext>
+            </a:extLst>
+          </p:cNvPr>
+          <p:cNvPicPr>
+            <a:picLocks noChangeAspect="1"/>
+          </p:cNvPicPr>
+          <p:nvPr/>
+        </p:nvPicPr>
+        <p:blipFill rotWithShape="1">
+          <a:blip r:embed="rId3" cstate="print">
+            <a:duotone>
+              <a:schemeClr val="accent2">
+                <a:shade val="45000"/>
+                <a:satMod val="135000"/>
+              </a:schemeClr>
+              <a:prstClr val="white"/>
+            </a:duotone>
+            <a:extLst>
+              <a:ext uri="{28A0092B-C50C-407E-A947-70E740481C1C}">
+                <a14:useLocalDpi xmlns:a14="http://schemas.microsoft.com/office/drawing/2010/main" val="0"/>
+              </a:ext>
+            </a:extLst>
+          </a:blip>
+          <a:srcRect l="1280" t="-1091" r="31077" b="1091"/>
+          <a:stretch/>
+        </p:blipFill>
+        <p:spPr>
+          <a:xfrm flipH="1">
+            <a:off x="4320155" y="4303769"/>
+            <a:ext cx="149233" cy="220619"/>
+          </a:xfrm>
+          <a:prstGeom prst="rect">
+            <a:avLst/>
+          </a:prstGeom>
+        </p:spPr>
+      </p:pic>
+      <p:grpSp>
+        <p:nvGrpSpPr>
+          <p:cNvPr id="17" name="그룹 16">
+            <a:extLst>
+              <a:ext uri="{FF2B5EF4-FFF2-40B4-BE49-F238E27FC236}">
+                <a16:creationId xmlns:a16="http://schemas.microsoft.com/office/drawing/2014/main" id="{216C70A0-1CEF-49EA-836F-8C1FE4D528DA}"/>
+              </a:ext>
+            </a:extLst>
+          </p:cNvPr>
+          <p:cNvGrpSpPr/>
+          <p:nvPr/>
+        </p:nvGrpSpPr>
+        <p:grpSpPr>
+          <a:xfrm>
+            <a:off x="1583999" y="1761237"/>
+            <a:ext cx="2810773" cy="276350"/>
+            <a:chOff x="1765300" y="1879600"/>
+            <a:chExt cx="2620433" cy="266829"/>
+          </a:xfrm>
+        </p:grpSpPr>
+        <p:sp>
+          <p:nvSpPr>
+            <p:cNvPr id="15" name="사각형: 둥근 모서리 14">
+              <a:extLst>
+                <a:ext uri="{FF2B5EF4-FFF2-40B4-BE49-F238E27FC236}">
+                  <a16:creationId xmlns:a16="http://schemas.microsoft.com/office/drawing/2014/main" id="{6272DC34-598B-4129-8FC8-496E02650B43}"/>
+                </a:ext>
+              </a:extLst>
+            </p:cNvPr>
+            <p:cNvSpPr/>
+            <p:nvPr/>
+          </p:nvSpPr>
+          <p:spPr>
+            <a:xfrm>
+              <a:off x="1765300" y="1879600"/>
+              <a:ext cx="2620433" cy="266829"/>
+            </a:xfrm>
+            <a:prstGeom prst="roundRect">
+              <a:avLst/>
+            </a:prstGeom>
+            <a:solidFill>
+              <a:srgbClr val="FFFFFF"/>
+            </a:solidFill>
+            <a:ln>
+              <a:solidFill>
+                <a:srgbClr val="F28E83"/>
+              </a:solidFill>
+            </a:ln>
+          </p:spPr>
+          <p:style>
+            <a:lnRef idx="2">
+              <a:schemeClr val="accent1">
+                <a:shade val="50000"/>
+              </a:schemeClr>
+            </a:lnRef>
+            <a:fillRef idx="1">
+              <a:schemeClr val="accent1"/>
+            </a:fillRef>
+            <a:effectRef idx="0">
+              <a:schemeClr val="accent1"/>
+            </a:effectRef>
+            <a:fontRef idx="minor">
+              <a:schemeClr val="lt1"/>
+            </a:fontRef>
+          </p:style>
+          <p:txBody>
+            <a:bodyPr rtlCol="0" anchor="ctr"/>
+            <a:lstStyle/>
+            <a:p>
+              <a:pPr algn="ctr"/>
+              <a:endParaRPr lang="ko-KR" altLang="en-US"/>
+            </a:p>
+          </p:txBody>
+        </p:sp>
+        <p:pic>
+          <p:nvPicPr>
+            <p:cNvPr id="16" name="그림 15">
+              <a:extLst>
+                <a:ext uri="{FF2B5EF4-FFF2-40B4-BE49-F238E27FC236}">
+                  <a16:creationId xmlns:a16="http://schemas.microsoft.com/office/drawing/2014/main" id="{9E97BE9D-B1B1-4441-87B9-BB23D5C6B82F}"/>
+                </a:ext>
+              </a:extLst>
+            </p:cNvPr>
+            <p:cNvPicPr>
+              <a:picLocks noChangeAspect="1"/>
+            </p:cNvPicPr>
+            <p:nvPr/>
+          </p:nvPicPr>
+          <p:blipFill rotWithShape="1">
+            <a:blip r:embed="rId4"/>
+            <a:srcRect l="10673" t="19212" r="18391" b="20197"/>
+            <a:stretch/>
+          </p:blipFill>
+          <p:spPr>
+            <a:xfrm>
+              <a:off x="4126243" y="1929654"/>
+              <a:ext cx="158462" cy="158461"/>
+            </a:xfrm>
+            <a:prstGeom prst="rect">
+              <a:avLst/>
+            </a:prstGeom>
+          </p:spPr>
+        </p:pic>
+      </p:grpSp>
+      <p:sp>
+        <p:nvSpPr>
+          <p:cNvPr id="18" name="직사각형 17">
+            <a:extLst>
+              <a:ext uri="{FF2B5EF4-FFF2-40B4-BE49-F238E27FC236}">
+                <a16:creationId xmlns:a16="http://schemas.microsoft.com/office/drawing/2014/main" id="{6FBE2D1F-EA94-4586-BFF5-B385FA554C83}"/>
+              </a:ext>
+            </a:extLst>
+          </p:cNvPr>
+          <p:cNvSpPr/>
+          <p:nvPr/>
+        </p:nvSpPr>
+        <p:spPr>
+          <a:xfrm>
+            <a:off x="1646246" y="1795457"/>
+            <a:ext cx="494952" cy="205334"/>
+          </a:xfrm>
+          <a:prstGeom prst="rect">
+            <a:avLst/>
+          </a:prstGeom>
+          <a:solidFill>
+            <a:srgbClr val="FFFFFF"/>
+          </a:solidFill>
+          <a:ln>
+            <a:solidFill>
+              <a:srgbClr val="FFFFFF"/>
+            </a:solidFill>
+          </a:ln>
+        </p:spPr>
+        <p:style>
+          <a:lnRef idx="2">
+            <a:schemeClr val="accent1">
+              <a:shade val="50000"/>
+            </a:schemeClr>
+          </a:lnRef>
+          <a:fillRef idx="1">
+            <a:schemeClr val="accent1"/>
+          </a:fillRef>
+          <a:effectRef idx="0">
+            <a:schemeClr val="accent1"/>
+          </a:effectRef>
+          <a:fontRef idx="minor">
+            <a:schemeClr val="lt1"/>
+          </a:fontRef>
+        </p:style>
+        <p:txBody>
+          <a:bodyPr rtlCol="0" anchor="ctr"/>
+          <a:lstStyle/>
+          <a:p>
+            <a:pPr algn="ctr"/>
+            <a:r>
+              <a:rPr lang="ko-KR" altLang="en-US" sz="1000" dirty="0">
+                <a:solidFill>
+                  <a:schemeClr val="bg1">
+                    <a:lumMod val="75000"/>
+                  </a:schemeClr>
+                </a:solidFill>
+              </a:rPr>
+              <a:t>검색</a:t>
+            </a:r>
+          </a:p>
+        </p:txBody>
+      </p:sp>
+      <p:sp>
+        <p:nvSpPr>
+          <p:cNvPr id="74" name="타원 73">
+            <a:extLst>
+              <a:ext uri="{FF2B5EF4-FFF2-40B4-BE49-F238E27FC236}">
+                <a16:creationId xmlns:a16="http://schemas.microsoft.com/office/drawing/2014/main" id="{D60E97B0-06B3-4FC9-8F7C-FD22E06CCF0E}"/>
+              </a:ext>
+            </a:extLst>
+          </p:cNvPr>
+          <p:cNvSpPr/>
+          <p:nvPr/>
+        </p:nvSpPr>
+        <p:spPr>
+          <a:xfrm>
+            <a:off x="2095874" y="1746687"/>
+            <a:ext cx="297352" cy="290900"/>
+          </a:xfrm>
+          <a:prstGeom prst="ellipse">
+            <a:avLst/>
+          </a:prstGeom>
+          <a:solidFill>
+            <a:srgbClr val="F6CF40"/>
+          </a:solidFill>
+          <a:ln>
+            <a:noFill/>
+          </a:ln>
+        </p:spPr>
+        <p:style>
+          <a:lnRef idx="2">
+            <a:schemeClr val="accent1">
+              <a:shade val="50000"/>
+            </a:schemeClr>
+          </a:lnRef>
+          <a:fillRef idx="1">
+            <a:schemeClr val="accent1"/>
+          </a:fillRef>
+          <a:effectRef idx="0">
+            <a:schemeClr val="accent1"/>
+          </a:effectRef>
+          <a:fontRef idx="minor">
+            <a:schemeClr val="lt1"/>
+          </a:fontRef>
+        </p:style>
+        <p:txBody>
+          <a:bodyPr rtlCol="0" anchor="ctr"/>
+          <a:lstStyle/>
+          <a:p>
+            <a:pPr algn="ctr"/>
+            <a:r>
+              <a:rPr lang="en-US" altLang="ko-KR" dirty="0"/>
+              <a:t>2</a:t>
+            </a:r>
+            <a:endParaRPr lang="ko-KR" altLang="en-US" dirty="0"/>
+          </a:p>
+        </p:txBody>
+      </p:sp>
+      <p:graphicFrame>
+        <p:nvGraphicFramePr>
+          <p:cNvPr id="22" name="표 22">
+            <a:extLst>
+              <a:ext uri="{FF2B5EF4-FFF2-40B4-BE49-F238E27FC236}">
+                <a16:creationId xmlns:a16="http://schemas.microsoft.com/office/drawing/2014/main" id="{8756AC1F-2B97-4D46-A59F-2290109241F7}"/>
+              </a:ext>
+            </a:extLst>
+          </p:cNvPr>
+          <p:cNvGraphicFramePr>
+            <a:graphicFrameLocks noGrp="1"/>
+          </p:cNvGraphicFramePr>
+          <p:nvPr/>
+        </p:nvGraphicFramePr>
+        <p:xfrm>
+          <a:off x="5807229" y="1808638"/>
+          <a:ext cx="4871632" cy="3840465"/>
+        </p:xfrm>
+        <a:graphic>
+          <a:graphicData uri="http://schemas.openxmlformats.org/drawingml/2006/table">
+            <a:tbl>
+              <a:tblPr firstRow="1" bandRow="1">
+                <a:tableStyleId>{5C22544A-7EE6-4342-B048-85BDC9FD1C3A}</a:tableStyleId>
+              </a:tblPr>
+              <a:tblGrid>
+                <a:gridCol w="544187">
+                  <a:extLst>
+                    <a:ext uri="{9D8B030D-6E8A-4147-A177-3AD203B41FA5}">
+                      <a16:colId xmlns:a16="http://schemas.microsoft.com/office/drawing/2014/main" val="3423798222"/>
+                    </a:ext>
+                  </a:extLst>
+                </a:gridCol>
+                <a:gridCol w="4327445">
+                  <a:extLst>
+                    <a:ext uri="{9D8B030D-6E8A-4147-A177-3AD203B41FA5}">
+                      <a16:colId xmlns:a16="http://schemas.microsoft.com/office/drawing/2014/main" val="2638630752"/>
+                    </a:ext>
+                  </a:extLst>
+                </a:gridCol>
+              </a:tblGrid>
+              <a:tr h="397605">
+                <a:tc>
+                  <a:txBody>
+                    <a:bodyPr/>
+                    <a:lstStyle/>
+                    <a:p>
+                      <a:pPr latinLnBrk="1"/>
+                      <a:endParaRPr lang="ko-KR" altLang="en-US" dirty="0">
+                        <a:latin typeface="210 콤퓨타세탁 L" panose="02020603020101020101" pitchFamily="18" charset="-127"/>
+                        <a:ea typeface="210 콤퓨타세탁 L" panose="02020603020101020101" pitchFamily="18" charset="-127"/>
+                      </a:endParaRPr>
+                    </a:p>
+                  </a:txBody>
+                  <a:tcPr anchor="ctr" anchorCtr="1">
+                    <a:solidFill>
+                      <a:srgbClr val="F0776A"/>
+                    </a:solidFill>
+                  </a:tcPr>
+                </a:tc>
+                <a:tc>
+                  <a:txBody>
+                    <a:bodyPr/>
+                    <a:lstStyle/>
+                    <a:p>
+                      <a:pPr latinLnBrk="1"/>
+                      <a:r>
+                        <a:rPr lang="ko-KR" altLang="en-US" dirty="0">
+                          <a:latin typeface="210 콤퓨타세탁 L" panose="02020603020101020101" pitchFamily="18" charset="-127"/>
+                          <a:ea typeface="210 콤퓨타세탁 L" panose="02020603020101020101" pitchFamily="18" charset="-127"/>
+                        </a:rPr>
+                        <a:t>기능 </a:t>
+                      </a:r>
+                    </a:p>
+                  </a:txBody>
+                  <a:tcPr anchor="ctr" anchorCtr="1">
+                    <a:solidFill>
+                      <a:srgbClr val="F0776A"/>
+                    </a:solidFill>
+                  </a:tcPr>
+                </a:tc>
+                <a:extLst>
+                  <a:ext uri="{0D108BD9-81ED-4DB2-BD59-A6C34878D82A}">
+                    <a16:rowId xmlns:a16="http://schemas.microsoft.com/office/drawing/2014/main" val="1260968731"/>
+                  </a:ext>
+                </a:extLst>
+              </a:tr>
+              <a:tr h="1664028">
+                <a:tc>
+                  <a:txBody>
+                    <a:bodyPr/>
+                    <a:lstStyle/>
+                    <a:p>
+                      <a:pPr latinLnBrk="1"/>
+                      <a:r>
+                        <a:rPr lang="en-US" altLang="ko-KR" dirty="0">
+                          <a:latin typeface="210 콤퓨타세탁 L" panose="02020603020101020101" pitchFamily="18" charset="-127"/>
+                          <a:ea typeface="210 콤퓨타세탁 L" panose="02020603020101020101" pitchFamily="18" charset="-127"/>
+                        </a:rPr>
+                        <a:t>1</a:t>
+                      </a:r>
+                      <a:endParaRPr lang="ko-KR" altLang="en-US" dirty="0">
+                        <a:latin typeface="210 콤퓨타세탁 L" panose="02020603020101020101" pitchFamily="18" charset="-127"/>
+                        <a:ea typeface="210 콤퓨타세탁 L" panose="02020603020101020101" pitchFamily="18" charset="-127"/>
+                      </a:endParaRPr>
+                    </a:p>
+                  </a:txBody>
+                  <a:tcPr anchor="ctr" anchorCtr="1">
+                    <a:solidFill>
+                      <a:srgbClr val="F9C8C3"/>
+                    </a:solidFill>
+                  </a:tcPr>
+                </a:tc>
+                <a:tc>
+                  <a:txBody>
+                    <a:bodyPr/>
+                    <a:lstStyle/>
+                    <a:p>
+                      <a:pPr latinLnBrk="1"/>
+                      <a:r>
+                        <a:rPr lang="ko-KR" altLang="en-US" dirty="0">
+                          <a:latin typeface="210 콤퓨타세탁 B" panose="02020603020101020101" pitchFamily="18" charset="-127"/>
+                          <a:ea typeface="210 콤퓨타세탁 B" panose="02020603020101020101" pitchFamily="18" charset="-127"/>
+                        </a:rPr>
+                        <a:t>메뉴</a:t>
+                      </a:r>
+                      <a:r>
+                        <a:rPr lang="en-US" altLang="ko-KR" dirty="0">
+                          <a:latin typeface="210 콤퓨타세탁 B" panose="02020603020101020101" pitchFamily="18" charset="-127"/>
+                          <a:ea typeface="210 콤퓨타세탁 B" panose="02020603020101020101" pitchFamily="18" charset="-127"/>
+                        </a:rPr>
+                        <a:t>/</a:t>
+                      </a:r>
+                      <a:r>
+                        <a:rPr lang="ko-KR" altLang="en-US" dirty="0">
+                          <a:latin typeface="210 콤퓨타세탁 B" panose="02020603020101020101" pitchFamily="18" charset="-127"/>
+                          <a:ea typeface="210 콤퓨타세탁 B" panose="02020603020101020101" pitchFamily="18" charset="-127"/>
+                        </a:rPr>
+                        <a:t>목록</a:t>
+                      </a:r>
+                      <a:endParaRPr lang="en-US" altLang="ko-KR" dirty="0">
+                        <a:latin typeface="210 콤퓨타세탁 B" panose="02020603020101020101" pitchFamily="18" charset="-127"/>
+                        <a:ea typeface="210 콤퓨타세탁 B" panose="02020603020101020101" pitchFamily="18" charset="-127"/>
+                      </a:endParaRPr>
+                    </a:p>
+                    <a:p>
+                      <a:pPr latinLnBrk="1"/>
+                      <a:r>
+                        <a:rPr lang="en-US" altLang="ko-KR" dirty="0">
+                          <a:latin typeface="210 콤퓨타세탁 L" panose="02020603020101020101" pitchFamily="18" charset="-127"/>
+                          <a:ea typeface="210 콤퓨타세탁 L" panose="02020603020101020101" pitchFamily="18" charset="-127"/>
+                        </a:rPr>
+                        <a:t>- </a:t>
+                      </a:r>
+                      <a:r>
+                        <a:rPr lang="ko-KR" altLang="en-US" dirty="0">
+                          <a:latin typeface="210 콤퓨타세탁 L" panose="02020603020101020101" pitchFamily="18" charset="-127"/>
+                          <a:ea typeface="210 콤퓨타세탁 L" panose="02020603020101020101" pitchFamily="18" charset="-127"/>
+                        </a:rPr>
+                        <a:t>검색 항목 및 항목 선택</a:t>
+                      </a:r>
+                      <a:endParaRPr lang="en-US" altLang="ko-KR" dirty="0">
+                        <a:latin typeface="210 콤퓨타세탁 L" panose="02020603020101020101" pitchFamily="18" charset="-127"/>
+                        <a:ea typeface="210 콤퓨타세탁 L" panose="02020603020101020101" pitchFamily="18" charset="-127"/>
+                      </a:endParaRPr>
+                    </a:p>
+                    <a:p>
+                      <a:pPr latinLnBrk="1"/>
+                      <a:r>
+                        <a:rPr lang="en-US" altLang="ko-KR" dirty="0">
+                          <a:latin typeface="210 콤퓨타세탁 L" panose="02020603020101020101" pitchFamily="18" charset="-127"/>
+                          <a:ea typeface="210 콤퓨타세탁 L" panose="02020603020101020101" pitchFamily="18" charset="-127"/>
+                        </a:rPr>
+                        <a:t>ex)</a:t>
+                      </a:r>
+                      <a:r>
+                        <a:rPr lang="ko-KR" altLang="en-US" dirty="0">
+                          <a:latin typeface="210 콤퓨타세탁 L" panose="02020603020101020101" pitchFamily="18" charset="-127"/>
+                          <a:ea typeface="210 콤퓨타세탁 L" panose="02020603020101020101" pitchFamily="18" charset="-127"/>
+                        </a:rPr>
+                        <a:t> 동물병원</a:t>
+                      </a:r>
+                      <a:r>
+                        <a:rPr lang="en-US" altLang="ko-KR" dirty="0">
+                          <a:latin typeface="210 콤퓨타세탁 L" panose="02020603020101020101" pitchFamily="18" charset="-127"/>
+                          <a:ea typeface="210 콤퓨타세탁 L" panose="02020603020101020101" pitchFamily="18" charset="-127"/>
+                        </a:rPr>
+                        <a:t>, </a:t>
+                      </a:r>
+                      <a:r>
+                        <a:rPr lang="ko-KR" altLang="en-US" dirty="0">
+                          <a:latin typeface="210 콤퓨타세탁 L" panose="02020603020101020101" pitchFamily="18" charset="-127"/>
+                          <a:ea typeface="210 콤퓨타세탁 L" panose="02020603020101020101" pitchFamily="18" charset="-127"/>
+                        </a:rPr>
+                        <a:t>동물약국</a:t>
+                      </a:r>
+                      <a:r>
+                        <a:rPr lang="en-US" altLang="ko-KR" dirty="0">
+                          <a:latin typeface="210 콤퓨타세탁 L" panose="02020603020101020101" pitchFamily="18" charset="-127"/>
+                          <a:ea typeface="210 콤퓨타세탁 L" panose="02020603020101020101" pitchFamily="18" charset="-127"/>
+                        </a:rPr>
+                        <a:t>, </a:t>
+                      </a:r>
+                      <a:r>
+                        <a:rPr lang="ko-KR" altLang="en-US" dirty="0">
+                          <a:latin typeface="210 콤퓨타세탁 L" panose="02020603020101020101" pitchFamily="18" charset="-127"/>
+                          <a:ea typeface="210 콤퓨타세탁 L" panose="02020603020101020101" pitchFamily="18" charset="-127"/>
+                        </a:rPr>
+                        <a:t>애완용품</a:t>
+                      </a:r>
+                    </a:p>
+                  </a:txBody>
+                  <a:tcPr anchor="ctr">
+                    <a:solidFill>
+                      <a:srgbClr val="F9C8C3"/>
+                    </a:solidFill>
+                  </a:tcPr>
+                </a:tc>
+                <a:extLst>
+                  <a:ext uri="{0D108BD9-81ED-4DB2-BD59-A6C34878D82A}">
+                    <a16:rowId xmlns:a16="http://schemas.microsoft.com/office/drawing/2014/main" val="3837323252"/>
+                  </a:ext>
+                </a:extLst>
+              </a:tr>
+              <a:tr h="1778832">
+                <a:tc>
+                  <a:txBody>
+                    <a:bodyPr/>
+                    <a:lstStyle/>
+                    <a:p>
+                      <a:pPr latinLnBrk="1"/>
+                      <a:r>
+                        <a:rPr lang="en-US" altLang="ko-KR" dirty="0">
+                          <a:latin typeface="210 콤퓨타세탁 L" panose="02020603020101020101" pitchFamily="18" charset="-127"/>
+                          <a:ea typeface="210 콤퓨타세탁 L" panose="02020603020101020101" pitchFamily="18" charset="-127"/>
+                        </a:rPr>
+                        <a:t>2</a:t>
+                      </a:r>
+                      <a:endParaRPr lang="ko-KR" altLang="en-US" dirty="0">
+                        <a:latin typeface="210 콤퓨타세탁 L" panose="02020603020101020101" pitchFamily="18" charset="-127"/>
+                        <a:ea typeface="210 콤퓨타세탁 L" panose="02020603020101020101" pitchFamily="18" charset="-127"/>
+                      </a:endParaRPr>
+                    </a:p>
+                  </a:txBody>
+                  <a:tcPr anchor="ctr" anchorCtr="1">
+                    <a:solidFill>
+                      <a:srgbClr val="F9C8C3"/>
+                    </a:solidFill>
+                  </a:tcPr>
+                </a:tc>
+                <a:tc>
+                  <a:txBody>
+                    <a:bodyPr/>
+                    <a:lstStyle/>
+                    <a:p>
+                      <a:pPr latinLnBrk="1"/>
+                      <a:r>
+                        <a:rPr lang="ko-KR" altLang="en-US" dirty="0">
+                          <a:latin typeface="210 콤퓨타세탁 B" panose="02020603020101020101" pitchFamily="18" charset="-127"/>
+                          <a:ea typeface="210 콤퓨타세탁 B" panose="02020603020101020101" pitchFamily="18" charset="-127"/>
+                        </a:rPr>
+                        <a:t>업체 검색</a:t>
+                      </a:r>
+                      <a:endParaRPr lang="en-US" altLang="ko-KR" dirty="0">
+                        <a:latin typeface="210 콤퓨타세탁 B" panose="02020603020101020101" pitchFamily="18" charset="-127"/>
+                        <a:ea typeface="210 콤퓨타세탁 B" panose="02020603020101020101" pitchFamily="18" charset="-127"/>
+                      </a:endParaRPr>
+                    </a:p>
+                    <a:p>
+                      <a:pPr latinLnBrk="1"/>
+                      <a:r>
+                        <a:rPr lang="en-US" altLang="ko-KR" dirty="0">
+                          <a:latin typeface="210 콤퓨타세탁 L" panose="02020603020101020101" pitchFamily="18" charset="-127"/>
+                          <a:ea typeface="210 콤퓨타세탁 L" panose="02020603020101020101" pitchFamily="18" charset="-127"/>
+                        </a:rPr>
+                        <a:t>- </a:t>
+                      </a:r>
+                      <a:r>
+                        <a:rPr lang="ko-KR" altLang="en-US" dirty="0" err="1">
+                          <a:latin typeface="210 콤퓨타세탁 L" panose="02020603020101020101" pitchFamily="18" charset="-127"/>
+                          <a:ea typeface="210 콤퓨타세탁 L" panose="02020603020101020101" pitchFamily="18" charset="-127"/>
+                        </a:rPr>
+                        <a:t>업소명</a:t>
+                      </a:r>
+                      <a:r>
+                        <a:rPr lang="ko-KR" altLang="en-US" dirty="0">
+                          <a:latin typeface="210 콤퓨타세탁 L" panose="02020603020101020101" pitchFamily="18" charset="-127"/>
+                          <a:ea typeface="210 콤퓨타세탁 L" panose="02020603020101020101" pitchFamily="18" charset="-127"/>
+                        </a:rPr>
+                        <a:t> 및 찾으려는 곳 근처의 업소 탐색</a:t>
+                      </a:r>
+                    </a:p>
+                  </a:txBody>
+                  <a:tcPr anchor="ctr">
+                    <a:solidFill>
+                      <a:srgbClr val="F9C8C3"/>
+                    </a:solidFill>
+                  </a:tcPr>
+                </a:tc>
+                <a:extLst>
+                  <a:ext uri="{0D108BD9-81ED-4DB2-BD59-A6C34878D82A}">
+                    <a16:rowId xmlns:a16="http://schemas.microsoft.com/office/drawing/2014/main" val="3125025003"/>
+                  </a:ext>
+                </a:extLst>
+              </a:tr>
+            </a:tbl>
+          </a:graphicData>
+        </a:graphic>
+      </p:graphicFrame>
+      <p:sp>
+        <p:nvSpPr>
+          <p:cNvPr id="78" name="타원 77">
+            <a:extLst>
+              <a:ext uri="{FF2B5EF4-FFF2-40B4-BE49-F238E27FC236}">
+                <a16:creationId xmlns:a16="http://schemas.microsoft.com/office/drawing/2014/main" id="{C8DAAC57-C586-4224-B100-53F0D7697164}"/>
+              </a:ext>
+            </a:extLst>
+          </p:cNvPr>
+          <p:cNvSpPr/>
+          <p:nvPr/>
+        </p:nvSpPr>
+        <p:spPr>
+          <a:xfrm>
+            <a:off x="784014" y="564718"/>
+            <a:ext cx="598092" cy="598092"/>
+          </a:xfrm>
+          <a:prstGeom prst="ellipse">
+            <a:avLst/>
+          </a:prstGeom>
+          <a:solidFill>
+            <a:srgbClr val="F28E83"/>
+          </a:solidFill>
+          <a:ln>
+            <a:noFill/>
+          </a:ln>
+        </p:spPr>
+        <p:style>
+          <a:lnRef idx="2">
+            <a:schemeClr val="accent1">
+              <a:shade val="50000"/>
+            </a:schemeClr>
+          </a:lnRef>
+          <a:fillRef idx="1">
+            <a:schemeClr val="accent1"/>
+          </a:fillRef>
+          <a:effectRef idx="0">
+            <a:schemeClr val="accent1"/>
+          </a:effectRef>
+          <a:fontRef idx="minor">
+            <a:schemeClr val="lt1"/>
+          </a:fontRef>
+        </p:style>
+        <p:txBody>
+          <a:bodyPr rtlCol="0" anchor="ctr"/>
+          <a:lstStyle/>
+          <a:p>
+            <a:pPr algn="ctr"/>
+            <a:endParaRPr lang="ko-KR" altLang="en-US"/>
+          </a:p>
+        </p:txBody>
+      </p:sp>
+      <p:pic>
+        <p:nvPicPr>
+          <p:cNvPr id="79" name="그림 78">
+            <a:extLst>
+              <a:ext uri="{FF2B5EF4-FFF2-40B4-BE49-F238E27FC236}">
+                <a16:creationId xmlns:a16="http://schemas.microsoft.com/office/drawing/2014/main" id="{B02342F4-61B0-43BC-A793-EE8D14C377D5}"/>
+              </a:ext>
+            </a:extLst>
+          </p:cNvPr>
+          <p:cNvPicPr>
+            <a:picLocks noChangeAspect="1"/>
+          </p:cNvPicPr>
+          <p:nvPr/>
+        </p:nvPicPr>
+        <p:blipFill>
+          <a:blip r:embed="rId5" cstate="print">
+            <a:extLst>
+              <a:ext uri="{28A0092B-C50C-407E-A947-70E740481C1C}">
+                <a14:useLocalDpi xmlns:a14="http://schemas.microsoft.com/office/drawing/2010/main" val="0"/>
+              </a:ext>
+            </a:extLst>
+          </a:blip>
+          <a:stretch>
+            <a:fillRect/>
+          </a:stretch>
+        </p:blipFill>
+        <p:spPr>
+          <a:xfrm>
+            <a:off x="840111" y="598801"/>
+            <a:ext cx="465946" cy="465946"/>
+          </a:xfrm>
+          <a:prstGeom prst="rect">
+            <a:avLst/>
+          </a:prstGeom>
+        </p:spPr>
+      </p:pic>
+      <p:sp>
+        <p:nvSpPr>
+          <p:cNvPr id="32" name="타원 31">
+            <a:extLst>
+              <a:ext uri="{FF2B5EF4-FFF2-40B4-BE49-F238E27FC236}">
+                <a16:creationId xmlns:a16="http://schemas.microsoft.com/office/drawing/2014/main" id="{384CB672-1BF4-423A-B3A7-64A4DA57BADD}"/>
+              </a:ext>
+            </a:extLst>
+          </p:cNvPr>
+          <p:cNvSpPr/>
+          <p:nvPr/>
+        </p:nvSpPr>
+        <p:spPr>
+          <a:xfrm>
+            <a:off x="777681" y="1532381"/>
+            <a:ext cx="310303" cy="306392"/>
+          </a:xfrm>
+          <a:prstGeom prst="ellipse">
+            <a:avLst/>
+          </a:prstGeom>
+          <a:solidFill>
+            <a:srgbClr val="F6CF40"/>
+          </a:solidFill>
+          <a:ln>
+            <a:noFill/>
+          </a:ln>
+        </p:spPr>
+        <p:style>
+          <a:lnRef idx="2">
+            <a:schemeClr val="accent1">
+              <a:shade val="50000"/>
+            </a:schemeClr>
+          </a:lnRef>
+          <a:fillRef idx="1">
+            <a:schemeClr val="accent1"/>
+          </a:fillRef>
+          <a:effectRef idx="0">
+            <a:schemeClr val="accent1"/>
+          </a:effectRef>
+          <a:fontRef idx="minor">
+            <a:schemeClr val="lt1"/>
+          </a:fontRef>
+        </p:style>
+        <p:txBody>
+          <a:bodyPr rtlCol="0" anchor="ctr"/>
+          <a:lstStyle/>
+          <a:p>
+            <a:pPr algn="ctr"/>
+            <a:r>
+              <a:rPr lang="en-US" altLang="ko-KR" dirty="0"/>
+              <a:t>1</a:t>
+            </a:r>
+            <a:endParaRPr lang="ko-KR" altLang="en-US" dirty="0"/>
+          </a:p>
+        </p:txBody>
+      </p:sp>
+      <p:cxnSp>
+        <p:nvCxnSpPr>
+          <p:cNvPr id="33" name="직선 연결선 32">
+            <a:extLst>
+              <a:ext uri="{FF2B5EF4-FFF2-40B4-BE49-F238E27FC236}">
+                <a16:creationId xmlns:a16="http://schemas.microsoft.com/office/drawing/2014/main" id="{7488F08A-2F21-4235-8E6B-E497788DC24E}"/>
+              </a:ext>
+            </a:extLst>
+          </p:cNvPr>
+          <p:cNvCxnSpPr/>
+          <p:nvPr/>
+        </p:nvCxnSpPr>
+        <p:spPr>
+          <a:xfrm>
+            <a:off x="10367725" y="457260"/>
+            <a:ext cx="0" cy="364319"/>
+          </a:xfrm>
+          <a:prstGeom prst="line">
+            <a:avLst/>
+          </a:prstGeom>
+          <a:ln w="12700">
+            <a:solidFill>
+              <a:srgbClr val="C8C8C8"/>
+            </a:solidFill>
+          </a:ln>
+        </p:spPr>
+        <p:style>
+          <a:lnRef idx="1">
+            <a:schemeClr val="accent1"/>
+          </a:lnRef>
+          <a:fillRef idx="0">
+            <a:schemeClr val="accent1"/>
+          </a:fillRef>
+          <a:effectRef idx="0">
+            <a:schemeClr val="accent1"/>
+          </a:effectRef>
+          <a:fontRef idx="minor">
+            <a:schemeClr val="tx1"/>
+          </a:fontRef>
+        </p:style>
+      </p:cxnSp>
+      <p:cxnSp>
+        <p:nvCxnSpPr>
+          <p:cNvPr id="35" name="직선 연결선 34">
+            <a:extLst>
+              <a:ext uri="{FF2B5EF4-FFF2-40B4-BE49-F238E27FC236}">
+                <a16:creationId xmlns:a16="http://schemas.microsoft.com/office/drawing/2014/main" id="{0053D293-1054-4FDE-BE73-73E607A223E4}"/>
+              </a:ext>
+            </a:extLst>
+          </p:cNvPr>
+          <p:cNvCxnSpPr/>
+          <p:nvPr/>
+        </p:nvCxnSpPr>
+        <p:spPr>
+          <a:xfrm>
+            <a:off x="11634461" y="457260"/>
+            <a:ext cx="0" cy="364319"/>
+          </a:xfrm>
+          <a:prstGeom prst="line">
+            <a:avLst/>
+          </a:prstGeom>
+          <a:ln w="12700">
+            <a:solidFill>
+              <a:srgbClr val="C8C8C8"/>
+            </a:solidFill>
+          </a:ln>
+        </p:spPr>
+        <p:style>
+          <a:lnRef idx="1">
+            <a:schemeClr val="accent1"/>
+          </a:lnRef>
+          <a:fillRef idx="0">
+            <a:schemeClr val="accent1"/>
+          </a:fillRef>
+          <a:effectRef idx="0">
+            <a:schemeClr val="accent1"/>
+          </a:effectRef>
+          <a:fontRef idx="minor">
+            <a:schemeClr val="tx1"/>
+          </a:fontRef>
+        </p:style>
+      </p:cxnSp>
+      <p:sp>
+        <p:nvSpPr>
+          <p:cNvPr id="36" name="TextBox 35">
+            <a:extLst>
+              <a:ext uri="{FF2B5EF4-FFF2-40B4-BE49-F238E27FC236}">
+                <a16:creationId xmlns:a16="http://schemas.microsoft.com/office/drawing/2014/main" id="{A1A9A8A3-EA7B-436A-8C83-E0A11B9C93CE}"/>
+              </a:ext>
+            </a:extLst>
+          </p:cNvPr>
+          <p:cNvSpPr txBox="1"/>
+          <p:nvPr/>
+        </p:nvSpPr>
+        <p:spPr>
+          <a:xfrm>
+            <a:off x="10371708" y="512461"/>
+            <a:ext cx="1297150" cy="253916"/>
+          </a:xfrm>
+          <a:prstGeom prst="rect">
+            <a:avLst/>
+          </a:prstGeom>
+          <a:noFill/>
+          <a:scene3d>
+            <a:camera prst="obliqueTopLeft"/>
+            <a:lightRig rig="threePt" dir="t"/>
+          </a:scene3d>
+        </p:spPr>
+        <p:txBody>
+          <a:bodyPr wrap="none" rtlCol="0">
+            <a:spAutoFit/>
+          </a:bodyPr>
+          <a:lstStyle/>
+          <a:p>
+            <a:r>
+              <a:rPr lang="ko-KR" altLang="en-US" sz="1050" spc="300">
+                <a:solidFill>
+                  <a:schemeClr val="bg2">
+                    <a:lumMod val="75000"/>
+                  </a:schemeClr>
+                </a:solidFill>
+                <a:latin typeface="210 콤퓨타세탁 L" panose="02020603020101020101" pitchFamily="18" charset="-127"/>
+                <a:ea typeface="210 콤퓨타세탁 L" panose="02020603020101020101" pitchFamily="18" charset="-127"/>
+              </a:rPr>
+              <a:t>다섯 </a:t>
+            </a:r>
+            <a:r>
+              <a:rPr lang="ko-KR" altLang="en-US" sz="1050" spc="300" dirty="0">
+                <a:solidFill>
+                  <a:schemeClr val="bg2">
+                    <a:lumMod val="75000"/>
+                  </a:schemeClr>
+                </a:solidFill>
+                <a:latin typeface="210 콤퓨타세탁 L" panose="02020603020101020101" pitchFamily="18" charset="-127"/>
+                <a:ea typeface="210 콤퓨타세탁 L" panose="02020603020101020101" pitchFamily="18" charset="-127"/>
+              </a:rPr>
+              <a:t>번째 목차</a:t>
+            </a:r>
+          </a:p>
+        </p:txBody>
+      </p:sp>
+      <p:cxnSp>
+        <p:nvCxnSpPr>
+          <p:cNvPr id="37" name="직선 연결선 36">
+            <a:extLst>
+              <a:ext uri="{FF2B5EF4-FFF2-40B4-BE49-F238E27FC236}">
+                <a16:creationId xmlns:a16="http://schemas.microsoft.com/office/drawing/2014/main" id="{8CAB3620-359A-481F-BA8C-4787B56899F1}"/>
+              </a:ext>
+            </a:extLst>
+          </p:cNvPr>
+          <p:cNvCxnSpPr/>
+          <p:nvPr/>
+        </p:nvCxnSpPr>
+        <p:spPr>
+          <a:xfrm>
+            <a:off x="9100989" y="457260"/>
+            <a:ext cx="0" cy="364319"/>
+          </a:xfrm>
+          <a:prstGeom prst="line">
+            <a:avLst/>
+          </a:prstGeom>
+          <a:ln w="12700">
+            <a:solidFill>
+              <a:srgbClr val="C8C8C8"/>
+            </a:solidFill>
+          </a:ln>
+        </p:spPr>
+        <p:style>
+          <a:lnRef idx="1">
+            <a:schemeClr val="accent1"/>
+          </a:lnRef>
+          <a:fillRef idx="0">
+            <a:schemeClr val="accent1"/>
+          </a:fillRef>
+          <a:effectRef idx="0">
+            <a:schemeClr val="accent1"/>
+          </a:effectRef>
+          <a:fontRef idx="minor">
+            <a:schemeClr val="tx1"/>
+          </a:fontRef>
+        </p:style>
+      </p:cxnSp>
+      <p:sp>
+        <p:nvSpPr>
+          <p:cNvPr id="38" name="TextBox 37">
+            <a:extLst>
+              <a:ext uri="{FF2B5EF4-FFF2-40B4-BE49-F238E27FC236}">
+                <a16:creationId xmlns:a16="http://schemas.microsoft.com/office/drawing/2014/main" id="{C49FBD58-EB08-4BF3-9341-7F704D238601}"/>
+              </a:ext>
+            </a:extLst>
+          </p:cNvPr>
+          <p:cNvSpPr txBox="1"/>
+          <p:nvPr/>
+        </p:nvSpPr>
+        <p:spPr>
+          <a:xfrm>
+            <a:off x="9165932" y="512461"/>
+            <a:ext cx="1136850" cy="253916"/>
+          </a:xfrm>
+          <a:prstGeom prst="rect">
+            <a:avLst/>
+          </a:prstGeom>
+          <a:noFill/>
+          <a:scene3d>
+            <a:camera prst="obliqueTopLeft"/>
+            <a:lightRig rig="threePt" dir="t"/>
+          </a:scene3d>
+        </p:spPr>
+        <p:txBody>
+          <a:bodyPr wrap="none" rtlCol="0">
+            <a:spAutoFit/>
+          </a:bodyPr>
+          <a:lstStyle/>
+          <a:p>
+            <a:r>
+              <a:rPr lang="ko-KR" altLang="en-US" sz="1050" spc="300" dirty="0">
+                <a:solidFill>
+                  <a:schemeClr val="bg2">
+                    <a:lumMod val="75000"/>
+                  </a:schemeClr>
+                </a:solidFill>
+                <a:latin typeface="210 콤퓨타세탁 L" panose="02020603020101020101" pitchFamily="18" charset="-127"/>
+                <a:ea typeface="210 콤퓨타세탁 L" panose="02020603020101020101" pitchFamily="18" charset="-127"/>
+              </a:rPr>
+              <a:t>네 번째 목차</a:t>
+            </a:r>
+          </a:p>
+        </p:txBody>
+      </p:sp>
+      <p:cxnSp>
+        <p:nvCxnSpPr>
+          <p:cNvPr id="39" name="직선 연결선 38">
+            <a:extLst>
+              <a:ext uri="{FF2B5EF4-FFF2-40B4-BE49-F238E27FC236}">
+                <a16:creationId xmlns:a16="http://schemas.microsoft.com/office/drawing/2014/main" id="{FF8A8A16-55BB-4A83-BC04-11AA266B231A}"/>
+              </a:ext>
+            </a:extLst>
+          </p:cNvPr>
+          <p:cNvCxnSpPr/>
+          <p:nvPr/>
+        </p:nvCxnSpPr>
+        <p:spPr>
+          <a:xfrm>
+            <a:off x="7834253" y="457260"/>
+            <a:ext cx="0" cy="364319"/>
+          </a:xfrm>
+          <a:prstGeom prst="line">
+            <a:avLst/>
+          </a:prstGeom>
+          <a:ln w="12700">
+            <a:solidFill>
+              <a:srgbClr val="C8C8C8"/>
+            </a:solidFill>
+          </a:ln>
+        </p:spPr>
+        <p:style>
+          <a:lnRef idx="1">
+            <a:schemeClr val="accent1"/>
+          </a:lnRef>
+          <a:fillRef idx="0">
+            <a:schemeClr val="accent1"/>
+          </a:fillRef>
+          <a:effectRef idx="0">
+            <a:schemeClr val="accent1"/>
+          </a:effectRef>
+          <a:fontRef idx="minor">
+            <a:schemeClr val="tx1"/>
+          </a:fontRef>
+        </p:style>
+      </p:cxnSp>
+      <p:sp>
+        <p:nvSpPr>
+          <p:cNvPr id="40" name="TextBox 39">
+            <a:extLst>
+              <a:ext uri="{FF2B5EF4-FFF2-40B4-BE49-F238E27FC236}">
+                <a16:creationId xmlns:a16="http://schemas.microsoft.com/office/drawing/2014/main" id="{D510862C-FB23-443B-905A-1BA415757D6F}"/>
+              </a:ext>
+            </a:extLst>
+          </p:cNvPr>
+          <p:cNvSpPr txBox="1"/>
+          <p:nvPr/>
+        </p:nvSpPr>
+        <p:spPr>
+          <a:xfrm>
+            <a:off x="7899196" y="512461"/>
+            <a:ext cx="1136850" cy="253916"/>
+          </a:xfrm>
+          <a:prstGeom prst="rect">
+            <a:avLst/>
+          </a:prstGeom>
+          <a:noFill/>
+          <a:scene3d>
+            <a:camera prst="obliqueTopLeft"/>
+            <a:lightRig rig="threePt" dir="t"/>
+          </a:scene3d>
+        </p:spPr>
+        <p:txBody>
+          <a:bodyPr wrap="none" rtlCol="0">
+            <a:spAutoFit/>
+          </a:bodyPr>
+          <a:lstStyle/>
+          <a:p>
+            <a:r>
+              <a:rPr lang="ko-KR" altLang="en-US" sz="1050" spc="300" dirty="0">
+                <a:solidFill>
+                  <a:schemeClr val="bg2">
+                    <a:lumMod val="75000"/>
+                  </a:schemeClr>
+                </a:solidFill>
+                <a:latin typeface="210 콤퓨타세탁 L" panose="02020603020101020101" pitchFamily="18" charset="-127"/>
+                <a:ea typeface="210 콤퓨타세탁 L" panose="02020603020101020101" pitchFamily="18" charset="-127"/>
+              </a:rPr>
+              <a:t>세 번째 목차</a:t>
+            </a:r>
+          </a:p>
+        </p:txBody>
+      </p:sp>
+      <p:sp>
+        <p:nvSpPr>
+          <p:cNvPr id="41" name="TextBox 40">
+            <a:extLst>
+              <a:ext uri="{FF2B5EF4-FFF2-40B4-BE49-F238E27FC236}">
+                <a16:creationId xmlns:a16="http://schemas.microsoft.com/office/drawing/2014/main" id="{4DC155A6-519F-490E-BAD5-CF6F005730CF}"/>
+              </a:ext>
+            </a:extLst>
+          </p:cNvPr>
+          <p:cNvSpPr txBox="1"/>
+          <p:nvPr/>
+        </p:nvSpPr>
+        <p:spPr>
+          <a:xfrm>
+            <a:off x="6631706" y="512461"/>
+            <a:ext cx="1136850" cy="253916"/>
+          </a:xfrm>
+          <a:prstGeom prst="rect">
+            <a:avLst/>
+          </a:prstGeom>
+          <a:noFill/>
+          <a:scene3d>
+            <a:camera prst="obliqueTopLeft"/>
+            <a:lightRig rig="threePt" dir="t"/>
+          </a:scene3d>
+        </p:spPr>
+        <p:txBody>
+          <a:bodyPr wrap="none" rtlCol="0">
+            <a:spAutoFit/>
+          </a:bodyPr>
+          <a:lstStyle/>
+          <a:p>
+            <a:r>
+              <a:rPr lang="ko-KR" altLang="en-US" sz="1050" spc="300" dirty="0">
+                <a:solidFill>
+                  <a:schemeClr val="bg2">
+                    <a:lumMod val="75000"/>
+                  </a:schemeClr>
+                </a:solidFill>
+                <a:latin typeface="210 콤퓨타세탁 L" panose="02020603020101020101" pitchFamily="18" charset="-127"/>
+                <a:ea typeface="210 콤퓨타세탁 L" panose="02020603020101020101" pitchFamily="18" charset="-127"/>
+              </a:rPr>
+              <a:t>두 번째 목차</a:t>
+            </a:r>
+          </a:p>
+        </p:txBody>
+      </p:sp>
+      <p:cxnSp>
+        <p:nvCxnSpPr>
+          <p:cNvPr id="42" name="직선 연결선 41">
+            <a:extLst>
+              <a:ext uri="{FF2B5EF4-FFF2-40B4-BE49-F238E27FC236}">
+                <a16:creationId xmlns:a16="http://schemas.microsoft.com/office/drawing/2014/main" id="{CD2EBC35-0E0E-423F-98D1-FFAF60534E43}"/>
+              </a:ext>
+            </a:extLst>
+          </p:cNvPr>
+          <p:cNvCxnSpPr/>
+          <p:nvPr/>
+        </p:nvCxnSpPr>
+        <p:spPr>
+          <a:xfrm>
+            <a:off x="6586014" y="457260"/>
+            <a:ext cx="0" cy="364319"/>
+          </a:xfrm>
+          <a:prstGeom prst="line">
+            <a:avLst/>
+          </a:prstGeom>
+          <a:ln w="12700">
+            <a:solidFill>
+              <a:srgbClr val="C8C8C8"/>
+            </a:solidFill>
+          </a:ln>
+        </p:spPr>
+        <p:style>
+          <a:lnRef idx="1">
+            <a:schemeClr val="accent1"/>
+          </a:lnRef>
+          <a:fillRef idx="0">
+            <a:schemeClr val="accent1"/>
+          </a:fillRef>
+          <a:effectRef idx="0">
+            <a:schemeClr val="accent1"/>
+          </a:effectRef>
+          <a:fontRef idx="minor">
+            <a:schemeClr val="tx1"/>
+          </a:fontRef>
+        </p:style>
+      </p:cxnSp>
+      <p:sp>
+        <p:nvSpPr>
+          <p:cNvPr id="43" name="TextBox 42">
+            <a:extLst>
+              <a:ext uri="{FF2B5EF4-FFF2-40B4-BE49-F238E27FC236}">
+                <a16:creationId xmlns:a16="http://schemas.microsoft.com/office/drawing/2014/main" id="{D8B05CD1-DCAF-40D0-B09B-D91F143EB16C}"/>
+              </a:ext>
+            </a:extLst>
+          </p:cNvPr>
+          <p:cNvSpPr txBox="1"/>
+          <p:nvPr/>
+        </p:nvSpPr>
+        <p:spPr>
+          <a:xfrm>
             <a:off x="5383467" y="512461"/>
             <a:ext cx="1136850" cy="253916"/>
           </a:xfrm>
@@ -5089,7 +7231,7 @@
     </p:spTree>
     <p:extLst>
       <p:ext uri="{BB962C8B-B14F-4D97-AF65-F5344CB8AC3E}">
-        <p14:creationId xmlns:p14="http://schemas.microsoft.com/office/powerpoint/2010/main" val="1596192221"/>
+        <p14:creationId xmlns:p14="http://schemas.microsoft.com/office/powerpoint/2010/main" val="1429468499"/>
       </p:ext>
     </p:extLst>
   </p:cSld>
@@ -5099,7 +7241,7 @@
 </p:sld>
 </file>
 
-<file path=ppt/slides/slide2.xml><?xml version="1.0" encoding="utf-8"?>
+<file path=ppt/slides/slide3.xml><?xml version="1.0" encoding="utf-8"?>
 <p:sld xmlns:a="http://schemas.openxmlformats.org/drawingml/2006/main" xmlns:r="http://schemas.openxmlformats.org/officeDocument/2006/relationships" xmlns:p="http://schemas.openxmlformats.org/presentationml/2006/main">
   <p:cSld>
     <p:bg>
@@ -8556,7 +10698,7 @@
 </p:sld>
 </file>
 
-<file path=ppt/slides/slide3.xml><?xml version="1.0" encoding="utf-8"?>
+<file path=ppt/slides/slide4.xml><?xml version="1.0" encoding="utf-8"?>
 <p:sld xmlns:a="http://schemas.openxmlformats.org/drawingml/2006/main" xmlns:r="http://schemas.openxmlformats.org/officeDocument/2006/relationships" xmlns:p="http://schemas.openxmlformats.org/presentationml/2006/main">
   <p:cSld>
     <p:bg>
@@ -10716,7 +12858,7 @@
 </p:sld>
 </file>
 
-<file path=ppt/slides/slide4.xml><?xml version="1.0" encoding="utf-8"?>
+<file path=ppt/slides/slide5.xml><?xml version="1.0" encoding="utf-8"?>
 <p:sld xmlns:a="http://schemas.openxmlformats.org/drawingml/2006/main" xmlns:r="http://schemas.openxmlformats.org/officeDocument/2006/relationships" xmlns:p="http://schemas.openxmlformats.org/presentationml/2006/main">
   <p:cSld>
     <p:bg>
@@ -12291,7 +14433,7 @@
 </p:sld>
 </file>
 
-<file path=ppt/slides/slide5.xml><?xml version="1.0" encoding="utf-8"?>
+<file path=ppt/slides/slide6.xml><?xml version="1.0" encoding="utf-8"?>
 <p:sld xmlns:a="http://schemas.openxmlformats.org/drawingml/2006/main" xmlns:r="http://schemas.openxmlformats.org/officeDocument/2006/relationships" xmlns:p="http://schemas.openxmlformats.org/presentationml/2006/main">
   <p:cSld>
     <p:bg>
@@ -15167,7 +17309,7 @@
 </p:sld>
 </file>
 
-<file path=ppt/slides/slide6.xml><?xml version="1.0" encoding="utf-8"?>
+<file path=ppt/slides/slide7.xml><?xml version="1.0" encoding="utf-8"?>
 <p:sld xmlns:a="http://schemas.openxmlformats.org/drawingml/2006/main" xmlns:r="http://schemas.openxmlformats.org/officeDocument/2006/relationships" xmlns:p="http://schemas.openxmlformats.org/presentationml/2006/main">
   <p:cSld>
     <p:bg>

</xml_diff>